<commit_message>
fix Bezier with rectangle, NP
</commit_message>
<xml_diff>
--- a/images/image_design.pptx
+++ b/images/image_design.pptx
@@ -302,7 +302,7 @@
           <a:p>
             <a:fld id="{CE8103EF-6A06-4AFC-A2C6-FF5735AE5867}" type="datetimeFigureOut">
               <a:rPr lang="en-US" smtClean="0"/>
-              <a:t>3/2/2025</a:t>
+              <a:t>3/7/2025</a:t>
             </a:fld>
             <a:endParaRPr lang="en-US"/>
           </a:p>
@@ -502,7 +502,7 @@
           <a:p>
             <a:fld id="{CE8103EF-6A06-4AFC-A2C6-FF5735AE5867}" type="datetimeFigureOut">
               <a:rPr lang="en-US" smtClean="0"/>
-              <a:t>3/2/2025</a:t>
+              <a:t>3/7/2025</a:t>
             </a:fld>
             <a:endParaRPr lang="en-US"/>
           </a:p>
@@ -712,7 +712,7 @@
           <a:p>
             <a:fld id="{CE8103EF-6A06-4AFC-A2C6-FF5735AE5867}" type="datetimeFigureOut">
               <a:rPr lang="en-US" smtClean="0"/>
-              <a:t>3/2/2025</a:t>
+              <a:t>3/7/2025</a:t>
             </a:fld>
             <a:endParaRPr lang="en-US"/>
           </a:p>
@@ -912,7 +912,7 @@
           <a:p>
             <a:fld id="{CE8103EF-6A06-4AFC-A2C6-FF5735AE5867}" type="datetimeFigureOut">
               <a:rPr lang="en-US" smtClean="0"/>
-              <a:t>3/2/2025</a:t>
+              <a:t>3/7/2025</a:t>
             </a:fld>
             <a:endParaRPr lang="en-US"/>
           </a:p>
@@ -1188,7 +1188,7 @@
           <a:p>
             <a:fld id="{CE8103EF-6A06-4AFC-A2C6-FF5735AE5867}" type="datetimeFigureOut">
               <a:rPr lang="en-US" smtClean="0"/>
-              <a:t>3/2/2025</a:t>
+              <a:t>3/7/2025</a:t>
             </a:fld>
             <a:endParaRPr lang="en-US"/>
           </a:p>
@@ -1456,7 +1456,7 @@
           <a:p>
             <a:fld id="{CE8103EF-6A06-4AFC-A2C6-FF5735AE5867}" type="datetimeFigureOut">
               <a:rPr lang="en-US" smtClean="0"/>
-              <a:t>3/2/2025</a:t>
+              <a:t>3/7/2025</a:t>
             </a:fld>
             <a:endParaRPr lang="en-US"/>
           </a:p>
@@ -1871,7 +1871,7 @@
           <a:p>
             <a:fld id="{CE8103EF-6A06-4AFC-A2C6-FF5735AE5867}" type="datetimeFigureOut">
               <a:rPr lang="en-US" smtClean="0"/>
-              <a:t>3/2/2025</a:t>
+              <a:t>3/7/2025</a:t>
             </a:fld>
             <a:endParaRPr lang="en-US"/>
           </a:p>
@@ -2013,7 +2013,7 @@
           <a:p>
             <a:fld id="{CE8103EF-6A06-4AFC-A2C6-FF5735AE5867}" type="datetimeFigureOut">
               <a:rPr lang="en-US" smtClean="0"/>
-              <a:t>3/2/2025</a:t>
+              <a:t>3/7/2025</a:t>
             </a:fld>
             <a:endParaRPr lang="en-US"/>
           </a:p>
@@ -2126,7 +2126,7 @@
           <a:p>
             <a:fld id="{CE8103EF-6A06-4AFC-A2C6-FF5735AE5867}" type="datetimeFigureOut">
               <a:rPr lang="en-US" smtClean="0"/>
-              <a:t>3/2/2025</a:t>
+              <a:t>3/7/2025</a:t>
             </a:fld>
             <a:endParaRPr lang="en-US"/>
           </a:p>
@@ -2439,7 +2439,7 @@
           <a:p>
             <a:fld id="{CE8103EF-6A06-4AFC-A2C6-FF5735AE5867}" type="datetimeFigureOut">
               <a:rPr lang="en-US" smtClean="0"/>
-              <a:t>3/2/2025</a:t>
+              <a:t>3/7/2025</a:t>
             </a:fld>
             <a:endParaRPr lang="en-US"/>
           </a:p>
@@ -2728,7 +2728,7 @@
           <a:p>
             <a:fld id="{CE8103EF-6A06-4AFC-A2C6-FF5735AE5867}" type="datetimeFigureOut">
               <a:rPr lang="en-US" smtClean="0"/>
-              <a:t>3/2/2025</a:t>
+              <a:t>3/7/2025</a:t>
             </a:fld>
             <a:endParaRPr lang="en-US"/>
           </a:p>
@@ -2971,7 +2971,7 @@
           <a:p>
             <a:fld id="{CE8103EF-6A06-4AFC-A2C6-FF5735AE5867}" type="datetimeFigureOut">
               <a:rPr lang="en-US" smtClean="0"/>
-              <a:t>3/2/2025</a:t>
+              <a:t>3/7/2025</a:t>
             </a:fld>
             <a:endParaRPr lang="en-US"/>
           </a:p>
@@ -6639,6 +6639,2034 @@
           </a:p>
         </p:txBody>
       </p:sp>
+      <p:sp>
+        <p:nvSpPr>
+          <p:cNvPr id="2" name="Rechteck 1">
+            <a:extLst>
+              <a:ext uri="{FF2B5EF4-FFF2-40B4-BE49-F238E27FC236}">
+                <a16:creationId xmlns:a16="http://schemas.microsoft.com/office/drawing/2014/main" id="{F264B7C8-7A91-6F99-F3C2-AB925024BA77}"/>
+              </a:ext>
+            </a:extLst>
+          </p:cNvPr>
+          <p:cNvSpPr/>
+          <p:nvPr/>
+        </p:nvSpPr>
+        <p:spPr>
+          <a:xfrm>
+            <a:off x="7175500" y="836612"/>
+            <a:ext cx="3673508" cy="2390775"/>
+          </a:xfrm>
+          <a:prstGeom prst="rect">
+            <a:avLst/>
+          </a:prstGeom>
+          <a:solidFill>
+            <a:schemeClr val="tx1"/>
+          </a:solidFill>
+          <a:ln>
+            <a:noFill/>
+          </a:ln>
+        </p:spPr>
+        <p:style>
+          <a:lnRef idx="2">
+            <a:schemeClr val="accent1">
+              <a:shade val="15000"/>
+            </a:schemeClr>
+          </a:lnRef>
+          <a:fillRef idx="1">
+            <a:schemeClr val="accent1"/>
+          </a:fillRef>
+          <a:effectRef idx="0">
+            <a:schemeClr val="accent1"/>
+          </a:effectRef>
+          <a:fontRef idx="minor">
+            <a:schemeClr val="lt1"/>
+          </a:fontRef>
+        </p:style>
+        <p:txBody>
+          <a:bodyPr rtlCol="0" anchor="ctr"/>
+          <a:lstStyle/>
+          <a:p>
+            <a:pPr algn="ctr"/>
+            <a:endParaRPr lang="en-US"/>
+          </a:p>
+        </p:txBody>
+      </p:sp>
+      <p:cxnSp>
+        <p:nvCxnSpPr>
+          <p:cNvPr id="5" name="Gerader Verbinder 4">
+            <a:extLst>
+              <a:ext uri="{FF2B5EF4-FFF2-40B4-BE49-F238E27FC236}">
+                <a16:creationId xmlns:a16="http://schemas.microsoft.com/office/drawing/2014/main" id="{0549B71E-D961-185F-0256-A654A9603CE2}"/>
+              </a:ext>
+            </a:extLst>
+          </p:cNvPr>
+          <p:cNvCxnSpPr/>
+          <p:nvPr/>
+        </p:nvCxnSpPr>
+        <p:spPr>
+          <a:xfrm>
+            <a:off x="7424738" y="2533650"/>
+            <a:ext cx="3300412" cy="0"/>
+          </a:xfrm>
+          <a:prstGeom prst="line">
+            <a:avLst/>
+          </a:prstGeom>
+          <a:ln w="6350">
+            <a:solidFill>
+              <a:schemeClr val="bg1">
+                <a:lumMod val="50000"/>
+              </a:schemeClr>
+            </a:solidFill>
+            <a:tailEnd type="triangle"/>
+          </a:ln>
+        </p:spPr>
+        <p:style>
+          <a:lnRef idx="2">
+            <a:schemeClr val="accent1"/>
+          </a:lnRef>
+          <a:fillRef idx="0">
+            <a:schemeClr val="accent1"/>
+          </a:fillRef>
+          <a:effectRef idx="1">
+            <a:schemeClr val="accent1"/>
+          </a:effectRef>
+          <a:fontRef idx="minor">
+            <a:schemeClr val="tx1"/>
+          </a:fontRef>
+        </p:style>
+      </p:cxnSp>
+      <p:cxnSp>
+        <p:nvCxnSpPr>
+          <p:cNvPr id="6" name="Gerader Verbinder 5">
+            <a:extLst>
+              <a:ext uri="{FF2B5EF4-FFF2-40B4-BE49-F238E27FC236}">
+                <a16:creationId xmlns:a16="http://schemas.microsoft.com/office/drawing/2014/main" id="{AF4B937F-7D42-35ED-3DB2-A4B5B45BEA95}"/>
+              </a:ext>
+            </a:extLst>
+          </p:cNvPr>
+          <p:cNvCxnSpPr>
+            <a:cxnSpLocks/>
+          </p:cNvCxnSpPr>
+          <p:nvPr/>
+        </p:nvCxnSpPr>
+        <p:spPr>
+          <a:xfrm flipV="1">
+            <a:off x="8434388" y="917575"/>
+            <a:ext cx="0" cy="2206625"/>
+          </a:xfrm>
+          <a:prstGeom prst="line">
+            <a:avLst/>
+          </a:prstGeom>
+          <a:ln w="6350">
+            <a:solidFill>
+              <a:schemeClr val="bg1">
+                <a:lumMod val="50000"/>
+              </a:schemeClr>
+            </a:solidFill>
+            <a:tailEnd type="triangle"/>
+          </a:ln>
+        </p:spPr>
+        <p:style>
+          <a:lnRef idx="2">
+            <a:schemeClr val="accent1"/>
+          </a:lnRef>
+          <a:fillRef idx="0">
+            <a:schemeClr val="accent1"/>
+          </a:fillRef>
+          <a:effectRef idx="1">
+            <a:schemeClr val="accent1"/>
+          </a:effectRef>
+          <a:fontRef idx="minor">
+            <a:schemeClr val="tx1"/>
+          </a:fontRef>
+        </p:style>
+      </p:cxnSp>
+      <p:cxnSp>
+        <p:nvCxnSpPr>
+          <p:cNvPr id="9" name="Gerader Verbinder 8">
+            <a:extLst>
+              <a:ext uri="{FF2B5EF4-FFF2-40B4-BE49-F238E27FC236}">
+                <a16:creationId xmlns:a16="http://schemas.microsoft.com/office/drawing/2014/main" id="{D17E9780-4A11-132B-CB28-1C5B735DC9B2}"/>
+              </a:ext>
+            </a:extLst>
+          </p:cNvPr>
+          <p:cNvCxnSpPr>
+            <a:cxnSpLocks/>
+          </p:cNvCxnSpPr>
+          <p:nvPr/>
+        </p:nvCxnSpPr>
+        <p:spPr>
+          <a:xfrm flipV="1">
+            <a:off x="8702595" y="2493963"/>
+            <a:ext cx="0" cy="77819"/>
+          </a:xfrm>
+          <a:prstGeom prst="line">
+            <a:avLst/>
+          </a:prstGeom>
+          <a:ln w="6350">
+            <a:solidFill>
+              <a:schemeClr val="bg1">
+                <a:lumMod val="50000"/>
+              </a:schemeClr>
+            </a:solidFill>
+          </a:ln>
+        </p:spPr>
+        <p:style>
+          <a:lnRef idx="2">
+            <a:schemeClr val="accent1"/>
+          </a:lnRef>
+          <a:fillRef idx="0">
+            <a:schemeClr val="accent1"/>
+          </a:fillRef>
+          <a:effectRef idx="1">
+            <a:schemeClr val="accent1"/>
+          </a:effectRef>
+          <a:fontRef idx="minor">
+            <a:schemeClr val="tx1"/>
+          </a:fontRef>
+        </p:style>
+      </p:cxnSp>
+      <p:cxnSp>
+        <p:nvCxnSpPr>
+          <p:cNvPr id="13" name="Gerader Verbinder 12">
+            <a:extLst>
+              <a:ext uri="{FF2B5EF4-FFF2-40B4-BE49-F238E27FC236}">
+                <a16:creationId xmlns:a16="http://schemas.microsoft.com/office/drawing/2014/main" id="{1A66A058-782A-5289-D5C7-26EF9EBA805B}"/>
+              </a:ext>
+            </a:extLst>
+          </p:cNvPr>
+          <p:cNvCxnSpPr>
+            <a:cxnSpLocks/>
+          </p:cNvCxnSpPr>
+          <p:nvPr/>
+        </p:nvCxnSpPr>
+        <p:spPr>
+          <a:xfrm flipV="1">
+            <a:off x="8970682" y="2493963"/>
+            <a:ext cx="0" cy="77819"/>
+          </a:xfrm>
+          <a:prstGeom prst="line">
+            <a:avLst/>
+          </a:prstGeom>
+          <a:ln w="6350">
+            <a:solidFill>
+              <a:schemeClr val="bg1">
+                <a:lumMod val="50000"/>
+              </a:schemeClr>
+            </a:solidFill>
+          </a:ln>
+        </p:spPr>
+        <p:style>
+          <a:lnRef idx="2">
+            <a:schemeClr val="accent1"/>
+          </a:lnRef>
+          <a:fillRef idx="0">
+            <a:schemeClr val="accent1"/>
+          </a:fillRef>
+          <a:effectRef idx="1">
+            <a:schemeClr val="accent1"/>
+          </a:effectRef>
+          <a:fontRef idx="minor">
+            <a:schemeClr val="tx1"/>
+          </a:fontRef>
+        </p:style>
+      </p:cxnSp>
+      <p:cxnSp>
+        <p:nvCxnSpPr>
+          <p:cNvPr id="14" name="Gerader Verbinder 13">
+            <a:extLst>
+              <a:ext uri="{FF2B5EF4-FFF2-40B4-BE49-F238E27FC236}">
+                <a16:creationId xmlns:a16="http://schemas.microsoft.com/office/drawing/2014/main" id="{F8C0FB5F-1E8F-F4CD-DB1F-CC6F23563E5E}"/>
+              </a:ext>
+            </a:extLst>
+          </p:cNvPr>
+          <p:cNvCxnSpPr>
+            <a:cxnSpLocks/>
+          </p:cNvCxnSpPr>
+          <p:nvPr/>
+        </p:nvCxnSpPr>
+        <p:spPr>
+          <a:xfrm flipV="1">
+            <a:off x="9238769" y="2493963"/>
+            <a:ext cx="0" cy="77819"/>
+          </a:xfrm>
+          <a:prstGeom prst="line">
+            <a:avLst/>
+          </a:prstGeom>
+          <a:ln w="6350">
+            <a:solidFill>
+              <a:schemeClr val="bg1">
+                <a:lumMod val="50000"/>
+              </a:schemeClr>
+            </a:solidFill>
+          </a:ln>
+        </p:spPr>
+        <p:style>
+          <a:lnRef idx="2">
+            <a:schemeClr val="accent1"/>
+          </a:lnRef>
+          <a:fillRef idx="0">
+            <a:schemeClr val="accent1"/>
+          </a:fillRef>
+          <a:effectRef idx="1">
+            <a:schemeClr val="accent1"/>
+          </a:effectRef>
+          <a:fontRef idx="minor">
+            <a:schemeClr val="tx1"/>
+          </a:fontRef>
+        </p:style>
+      </p:cxnSp>
+      <p:cxnSp>
+        <p:nvCxnSpPr>
+          <p:cNvPr id="16" name="Gerader Verbinder 15">
+            <a:extLst>
+              <a:ext uri="{FF2B5EF4-FFF2-40B4-BE49-F238E27FC236}">
+                <a16:creationId xmlns:a16="http://schemas.microsoft.com/office/drawing/2014/main" id="{3B64132F-1C5A-626F-7146-CCE1235011F3}"/>
+              </a:ext>
+            </a:extLst>
+          </p:cNvPr>
+          <p:cNvCxnSpPr>
+            <a:cxnSpLocks/>
+          </p:cNvCxnSpPr>
+          <p:nvPr/>
+        </p:nvCxnSpPr>
+        <p:spPr>
+          <a:xfrm flipV="1">
+            <a:off x="9506856" y="2493963"/>
+            <a:ext cx="0" cy="77819"/>
+          </a:xfrm>
+          <a:prstGeom prst="line">
+            <a:avLst/>
+          </a:prstGeom>
+          <a:ln w="6350">
+            <a:solidFill>
+              <a:schemeClr val="bg1">
+                <a:lumMod val="50000"/>
+              </a:schemeClr>
+            </a:solidFill>
+          </a:ln>
+        </p:spPr>
+        <p:style>
+          <a:lnRef idx="2">
+            <a:schemeClr val="accent1"/>
+          </a:lnRef>
+          <a:fillRef idx="0">
+            <a:schemeClr val="accent1"/>
+          </a:fillRef>
+          <a:effectRef idx="1">
+            <a:schemeClr val="accent1"/>
+          </a:effectRef>
+          <a:fontRef idx="minor">
+            <a:schemeClr val="tx1"/>
+          </a:fontRef>
+        </p:style>
+      </p:cxnSp>
+      <p:cxnSp>
+        <p:nvCxnSpPr>
+          <p:cNvPr id="19" name="Gerader Verbinder 18">
+            <a:extLst>
+              <a:ext uri="{FF2B5EF4-FFF2-40B4-BE49-F238E27FC236}">
+                <a16:creationId xmlns:a16="http://schemas.microsoft.com/office/drawing/2014/main" id="{EAFDFA7E-C8F9-472B-37A3-6BE27F8700A8}"/>
+              </a:ext>
+            </a:extLst>
+          </p:cNvPr>
+          <p:cNvCxnSpPr>
+            <a:cxnSpLocks/>
+          </p:cNvCxnSpPr>
+          <p:nvPr/>
+        </p:nvCxnSpPr>
+        <p:spPr>
+          <a:xfrm flipV="1">
+            <a:off x="9774943" y="2493963"/>
+            <a:ext cx="0" cy="77819"/>
+          </a:xfrm>
+          <a:prstGeom prst="line">
+            <a:avLst/>
+          </a:prstGeom>
+          <a:ln w="6350">
+            <a:solidFill>
+              <a:schemeClr val="bg1">
+                <a:lumMod val="50000"/>
+              </a:schemeClr>
+            </a:solidFill>
+          </a:ln>
+        </p:spPr>
+        <p:style>
+          <a:lnRef idx="2">
+            <a:schemeClr val="accent1"/>
+          </a:lnRef>
+          <a:fillRef idx="0">
+            <a:schemeClr val="accent1"/>
+          </a:fillRef>
+          <a:effectRef idx="1">
+            <a:schemeClr val="accent1"/>
+          </a:effectRef>
+          <a:fontRef idx="minor">
+            <a:schemeClr val="tx1"/>
+          </a:fontRef>
+        </p:style>
+      </p:cxnSp>
+      <p:cxnSp>
+        <p:nvCxnSpPr>
+          <p:cNvPr id="20" name="Gerader Verbinder 19">
+            <a:extLst>
+              <a:ext uri="{FF2B5EF4-FFF2-40B4-BE49-F238E27FC236}">
+                <a16:creationId xmlns:a16="http://schemas.microsoft.com/office/drawing/2014/main" id="{9D62ACBE-18F6-D7D1-58DB-1882F880EF91}"/>
+              </a:ext>
+            </a:extLst>
+          </p:cNvPr>
+          <p:cNvCxnSpPr>
+            <a:cxnSpLocks/>
+          </p:cNvCxnSpPr>
+          <p:nvPr/>
+        </p:nvCxnSpPr>
+        <p:spPr>
+          <a:xfrm flipV="1">
+            <a:off x="10043030" y="2493963"/>
+            <a:ext cx="0" cy="77819"/>
+          </a:xfrm>
+          <a:prstGeom prst="line">
+            <a:avLst/>
+          </a:prstGeom>
+          <a:ln w="6350">
+            <a:solidFill>
+              <a:schemeClr val="bg1">
+                <a:lumMod val="50000"/>
+              </a:schemeClr>
+            </a:solidFill>
+          </a:ln>
+        </p:spPr>
+        <p:style>
+          <a:lnRef idx="2">
+            <a:schemeClr val="accent1"/>
+          </a:lnRef>
+          <a:fillRef idx="0">
+            <a:schemeClr val="accent1"/>
+          </a:fillRef>
+          <a:effectRef idx="1">
+            <a:schemeClr val="accent1"/>
+          </a:effectRef>
+          <a:fontRef idx="minor">
+            <a:schemeClr val="tx1"/>
+          </a:fontRef>
+        </p:style>
+      </p:cxnSp>
+      <p:cxnSp>
+        <p:nvCxnSpPr>
+          <p:cNvPr id="22" name="Gerader Verbinder 21">
+            <a:extLst>
+              <a:ext uri="{FF2B5EF4-FFF2-40B4-BE49-F238E27FC236}">
+                <a16:creationId xmlns:a16="http://schemas.microsoft.com/office/drawing/2014/main" id="{5CCD1C19-9C58-D26B-CDFF-2E491EE13328}"/>
+              </a:ext>
+            </a:extLst>
+          </p:cNvPr>
+          <p:cNvCxnSpPr>
+            <a:cxnSpLocks/>
+          </p:cNvCxnSpPr>
+          <p:nvPr/>
+        </p:nvCxnSpPr>
+        <p:spPr>
+          <a:xfrm flipV="1">
+            <a:off x="10311117" y="2493963"/>
+            <a:ext cx="0" cy="77819"/>
+          </a:xfrm>
+          <a:prstGeom prst="line">
+            <a:avLst/>
+          </a:prstGeom>
+          <a:ln w="6350">
+            <a:solidFill>
+              <a:schemeClr val="bg1">
+                <a:lumMod val="50000"/>
+              </a:schemeClr>
+            </a:solidFill>
+          </a:ln>
+        </p:spPr>
+        <p:style>
+          <a:lnRef idx="2">
+            <a:schemeClr val="accent1"/>
+          </a:lnRef>
+          <a:fillRef idx="0">
+            <a:schemeClr val="accent1"/>
+          </a:fillRef>
+          <a:effectRef idx="1">
+            <a:schemeClr val="accent1"/>
+          </a:effectRef>
+          <a:fontRef idx="minor">
+            <a:schemeClr val="tx1"/>
+          </a:fontRef>
+        </p:style>
+      </p:cxnSp>
+      <p:cxnSp>
+        <p:nvCxnSpPr>
+          <p:cNvPr id="27" name="Gerader Verbinder 26">
+            <a:extLst>
+              <a:ext uri="{FF2B5EF4-FFF2-40B4-BE49-F238E27FC236}">
+                <a16:creationId xmlns:a16="http://schemas.microsoft.com/office/drawing/2014/main" id="{AD099242-C14E-5D3F-BCC3-AF3B7972BAE5}"/>
+              </a:ext>
+            </a:extLst>
+          </p:cNvPr>
+          <p:cNvCxnSpPr>
+            <a:cxnSpLocks/>
+          </p:cNvCxnSpPr>
+          <p:nvPr/>
+        </p:nvCxnSpPr>
+        <p:spPr>
+          <a:xfrm flipV="1">
+            <a:off x="10579203" y="2493963"/>
+            <a:ext cx="0" cy="77819"/>
+          </a:xfrm>
+          <a:prstGeom prst="line">
+            <a:avLst/>
+          </a:prstGeom>
+          <a:ln w="6350">
+            <a:solidFill>
+              <a:schemeClr val="bg1">
+                <a:lumMod val="50000"/>
+              </a:schemeClr>
+            </a:solidFill>
+          </a:ln>
+        </p:spPr>
+        <p:style>
+          <a:lnRef idx="2">
+            <a:schemeClr val="accent1"/>
+          </a:lnRef>
+          <a:fillRef idx="0">
+            <a:schemeClr val="accent1"/>
+          </a:fillRef>
+          <a:effectRef idx="1">
+            <a:schemeClr val="accent1"/>
+          </a:effectRef>
+          <a:fontRef idx="minor">
+            <a:schemeClr val="tx1"/>
+          </a:fontRef>
+        </p:style>
+      </p:cxnSp>
+      <p:cxnSp>
+        <p:nvCxnSpPr>
+          <p:cNvPr id="29" name="Gerader Verbinder 28">
+            <a:extLst>
+              <a:ext uri="{FF2B5EF4-FFF2-40B4-BE49-F238E27FC236}">
+                <a16:creationId xmlns:a16="http://schemas.microsoft.com/office/drawing/2014/main" id="{8E44C8B9-7169-577F-A620-10C5E623E732}"/>
+              </a:ext>
+            </a:extLst>
+          </p:cNvPr>
+          <p:cNvCxnSpPr>
+            <a:cxnSpLocks/>
+          </p:cNvCxnSpPr>
+          <p:nvPr/>
+        </p:nvCxnSpPr>
+        <p:spPr>
+          <a:xfrm flipV="1">
+            <a:off x="7632620" y="2496360"/>
+            <a:ext cx="0" cy="77819"/>
+          </a:xfrm>
+          <a:prstGeom prst="line">
+            <a:avLst/>
+          </a:prstGeom>
+          <a:ln w="6350">
+            <a:solidFill>
+              <a:schemeClr val="bg1">
+                <a:lumMod val="50000"/>
+              </a:schemeClr>
+            </a:solidFill>
+          </a:ln>
+        </p:spPr>
+        <p:style>
+          <a:lnRef idx="2">
+            <a:schemeClr val="accent1"/>
+          </a:lnRef>
+          <a:fillRef idx="0">
+            <a:schemeClr val="accent1"/>
+          </a:fillRef>
+          <a:effectRef idx="1">
+            <a:schemeClr val="accent1"/>
+          </a:effectRef>
+          <a:fontRef idx="minor">
+            <a:schemeClr val="tx1"/>
+          </a:fontRef>
+        </p:style>
+      </p:cxnSp>
+      <p:cxnSp>
+        <p:nvCxnSpPr>
+          <p:cNvPr id="30" name="Gerader Verbinder 29">
+            <a:extLst>
+              <a:ext uri="{FF2B5EF4-FFF2-40B4-BE49-F238E27FC236}">
+                <a16:creationId xmlns:a16="http://schemas.microsoft.com/office/drawing/2014/main" id="{D7D69864-8846-86BE-092D-4E28F1B49BB6}"/>
+              </a:ext>
+            </a:extLst>
+          </p:cNvPr>
+          <p:cNvCxnSpPr>
+            <a:cxnSpLocks/>
+          </p:cNvCxnSpPr>
+          <p:nvPr/>
+        </p:nvCxnSpPr>
+        <p:spPr>
+          <a:xfrm flipV="1">
+            <a:off x="7900707" y="2496360"/>
+            <a:ext cx="0" cy="77819"/>
+          </a:xfrm>
+          <a:prstGeom prst="line">
+            <a:avLst/>
+          </a:prstGeom>
+          <a:ln w="6350">
+            <a:solidFill>
+              <a:schemeClr val="bg1">
+                <a:lumMod val="50000"/>
+              </a:schemeClr>
+            </a:solidFill>
+          </a:ln>
+        </p:spPr>
+        <p:style>
+          <a:lnRef idx="2">
+            <a:schemeClr val="accent1"/>
+          </a:lnRef>
+          <a:fillRef idx="0">
+            <a:schemeClr val="accent1"/>
+          </a:fillRef>
+          <a:effectRef idx="1">
+            <a:schemeClr val="accent1"/>
+          </a:effectRef>
+          <a:fontRef idx="minor">
+            <a:schemeClr val="tx1"/>
+          </a:fontRef>
+        </p:style>
+      </p:cxnSp>
+      <p:cxnSp>
+        <p:nvCxnSpPr>
+          <p:cNvPr id="31" name="Gerader Verbinder 30">
+            <a:extLst>
+              <a:ext uri="{FF2B5EF4-FFF2-40B4-BE49-F238E27FC236}">
+                <a16:creationId xmlns:a16="http://schemas.microsoft.com/office/drawing/2014/main" id="{3D744D88-608F-7736-98B0-11FEC828609F}"/>
+              </a:ext>
+            </a:extLst>
+          </p:cNvPr>
+          <p:cNvCxnSpPr>
+            <a:cxnSpLocks/>
+          </p:cNvCxnSpPr>
+          <p:nvPr/>
+        </p:nvCxnSpPr>
+        <p:spPr>
+          <a:xfrm flipV="1">
+            <a:off x="8168794" y="2496360"/>
+            <a:ext cx="0" cy="77819"/>
+          </a:xfrm>
+          <a:prstGeom prst="line">
+            <a:avLst/>
+          </a:prstGeom>
+          <a:ln w="6350">
+            <a:solidFill>
+              <a:schemeClr val="bg1">
+                <a:lumMod val="50000"/>
+              </a:schemeClr>
+            </a:solidFill>
+          </a:ln>
+        </p:spPr>
+        <p:style>
+          <a:lnRef idx="2">
+            <a:schemeClr val="accent1"/>
+          </a:lnRef>
+          <a:fillRef idx="0">
+            <a:schemeClr val="accent1"/>
+          </a:fillRef>
+          <a:effectRef idx="1">
+            <a:schemeClr val="accent1"/>
+          </a:effectRef>
+          <a:fontRef idx="minor">
+            <a:schemeClr val="tx1"/>
+          </a:fontRef>
+        </p:style>
+      </p:cxnSp>
+      <p:cxnSp>
+        <p:nvCxnSpPr>
+          <p:cNvPr id="33" name="Gerader Verbinder 32">
+            <a:extLst>
+              <a:ext uri="{FF2B5EF4-FFF2-40B4-BE49-F238E27FC236}">
+                <a16:creationId xmlns:a16="http://schemas.microsoft.com/office/drawing/2014/main" id="{E80A8F8F-0BAB-5E73-E60B-2FB64B0AE903}"/>
+              </a:ext>
+            </a:extLst>
+          </p:cNvPr>
+          <p:cNvCxnSpPr>
+            <a:cxnSpLocks/>
+          </p:cNvCxnSpPr>
+          <p:nvPr/>
+        </p:nvCxnSpPr>
+        <p:spPr>
+          <a:xfrm flipH="1">
+            <a:off x="8387200" y="2601249"/>
+            <a:ext cx="94376" cy="0"/>
+          </a:xfrm>
+          <a:prstGeom prst="line">
+            <a:avLst/>
+          </a:prstGeom>
+          <a:ln w="6350">
+            <a:solidFill>
+              <a:schemeClr val="bg1">
+                <a:lumMod val="50000"/>
+              </a:schemeClr>
+            </a:solidFill>
+          </a:ln>
+        </p:spPr>
+        <p:style>
+          <a:lnRef idx="2">
+            <a:schemeClr val="accent1"/>
+          </a:lnRef>
+          <a:fillRef idx="0">
+            <a:schemeClr val="accent1"/>
+          </a:fillRef>
+          <a:effectRef idx="1">
+            <a:schemeClr val="accent1"/>
+          </a:effectRef>
+          <a:fontRef idx="minor">
+            <a:schemeClr val="tx1"/>
+          </a:fontRef>
+        </p:style>
+      </p:cxnSp>
+      <p:cxnSp>
+        <p:nvCxnSpPr>
+          <p:cNvPr id="37" name="Gerader Verbinder 36">
+            <a:extLst>
+              <a:ext uri="{FF2B5EF4-FFF2-40B4-BE49-F238E27FC236}">
+                <a16:creationId xmlns:a16="http://schemas.microsoft.com/office/drawing/2014/main" id="{9F1E949C-306F-5839-3052-BF29C99BE1CA}"/>
+              </a:ext>
+            </a:extLst>
+          </p:cNvPr>
+          <p:cNvCxnSpPr>
+            <a:cxnSpLocks/>
+          </p:cNvCxnSpPr>
+          <p:nvPr/>
+        </p:nvCxnSpPr>
+        <p:spPr>
+          <a:xfrm flipH="1">
+            <a:off x="8387200" y="2288968"/>
+            <a:ext cx="94376" cy="0"/>
+          </a:xfrm>
+          <a:prstGeom prst="line">
+            <a:avLst/>
+          </a:prstGeom>
+          <a:ln w="6350">
+            <a:solidFill>
+              <a:schemeClr val="bg1">
+                <a:lumMod val="50000"/>
+              </a:schemeClr>
+            </a:solidFill>
+          </a:ln>
+        </p:spPr>
+        <p:style>
+          <a:lnRef idx="2">
+            <a:schemeClr val="accent1"/>
+          </a:lnRef>
+          <a:fillRef idx="0">
+            <a:schemeClr val="accent1"/>
+          </a:fillRef>
+          <a:effectRef idx="1">
+            <a:schemeClr val="accent1"/>
+          </a:effectRef>
+          <a:fontRef idx="minor">
+            <a:schemeClr val="tx1"/>
+          </a:fontRef>
+        </p:style>
+      </p:cxnSp>
+      <p:cxnSp>
+        <p:nvCxnSpPr>
+          <p:cNvPr id="38" name="Gerader Verbinder 37">
+            <a:extLst>
+              <a:ext uri="{FF2B5EF4-FFF2-40B4-BE49-F238E27FC236}">
+                <a16:creationId xmlns:a16="http://schemas.microsoft.com/office/drawing/2014/main" id="{171D37AB-C1ED-504E-31F0-0D06C491FFAE}"/>
+              </a:ext>
+            </a:extLst>
+          </p:cNvPr>
+          <p:cNvCxnSpPr>
+            <a:cxnSpLocks/>
+          </p:cNvCxnSpPr>
+          <p:nvPr/>
+        </p:nvCxnSpPr>
+        <p:spPr>
+          <a:xfrm flipH="1">
+            <a:off x="8387200" y="2043359"/>
+            <a:ext cx="94376" cy="0"/>
+          </a:xfrm>
+          <a:prstGeom prst="line">
+            <a:avLst/>
+          </a:prstGeom>
+          <a:ln w="6350">
+            <a:solidFill>
+              <a:schemeClr val="bg1">
+                <a:lumMod val="50000"/>
+              </a:schemeClr>
+            </a:solidFill>
+          </a:ln>
+        </p:spPr>
+        <p:style>
+          <a:lnRef idx="2">
+            <a:schemeClr val="accent1"/>
+          </a:lnRef>
+          <a:fillRef idx="0">
+            <a:schemeClr val="accent1"/>
+          </a:fillRef>
+          <a:effectRef idx="1">
+            <a:schemeClr val="accent1"/>
+          </a:effectRef>
+          <a:fontRef idx="minor">
+            <a:schemeClr val="tx1"/>
+          </a:fontRef>
+        </p:style>
+      </p:cxnSp>
+      <p:cxnSp>
+        <p:nvCxnSpPr>
+          <p:cNvPr id="39" name="Gerader Verbinder 38">
+            <a:extLst>
+              <a:ext uri="{FF2B5EF4-FFF2-40B4-BE49-F238E27FC236}">
+                <a16:creationId xmlns:a16="http://schemas.microsoft.com/office/drawing/2014/main" id="{F3CB8E86-BC01-CC58-D40C-0FD817E8105A}"/>
+              </a:ext>
+            </a:extLst>
+          </p:cNvPr>
+          <p:cNvCxnSpPr>
+            <a:cxnSpLocks/>
+          </p:cNvCxnSpPr>
+          <p:nvPr/>
+        </p:nvCxnSpPr>
+        <p:spPr>
+          <a:xfrm flipH="1">
+            <a:off x="8387200" y="1797750"/>
+            <a:ext cx="94376" cy="0"/>
+          </a:xfrm>
+          <a:prstGeom prst="line">
+            <a:avLst/>
+          </a:prstGeom>
+          <a:ln w="6350">
+            <a:solidFill>
+              <a:schemeClr val="bg1">
+                <a:lumMod val="50000"/>
+              </a:schemeClr>
+            </a:solidFill>
+          </a:ln>
+        </p:spPr>
+        <p:style>
+          <a:lnRef idx="2">
+            <a:schemeClr val="accent1"/>
+          </a:lnRef>
+          <a:fillRef idx="0">
+            <a:schemeClr val="accent1"/>
+          </a:fillRef>
+          <a:effectRef idx="1">
+            <a:schemeClr val="accent1"/>
+          </a:effectRef>
+          <a:fontRef idx="minor">
+            <a:schemeClr val="tx1"/>
+          </a:fontRef>
+        </p:style>
+      </p:cxnSp>
+      <p:cxnSp>
+        <p:nvCxnSpPr>
+          <p:cNvPr id="40" name="Gerader Verbinder 39">
+            <a:extLst>
+              <a:ext uri="{FF2B5EF4-FFF2-40B4-BE49-F238E27FC236}">
+                <a16:creationId xmlns:a16="http://schemas.microsoft.com/office/drawing/2014/main" id="{584AFA0D-761F-9BB3-B735-FB69E94D3B0D}"/>
+              </a:ext>
+            </a:extLst>
+          </p:cNvPr>
+          <p:cNvCxnSpPr>
+            <a:cxnSpLocks/>
+          </p:cNvCxnSpPr>
+          <p:nvPr/>
+        </p:nvCxnSpPr>
+        <p:spPr>
+          <a:xfrm flipH="1">
+            <a:off x="8387200" y="1552141"/>
+            <a:ext cx="94376" cy="0"/>
+          </a:xfrm>
+          <a:prstGeom prst="line">
+            <a:avLst/>
+          </a:prstGeom>
+          <a:ln w="6350">
+            <a:solidFill>
+              <a:schemeClr val="bg1">
+                <a:lumMod val="50000"/>
+              </a:schemeClr>
+            </a:solidFill>
+          </a:ln>
+        </p:spPr>
+        <p:style>
+          <a:lnRef idx="2">
+            <a:schemeClr val="accent1"/>
+          </a:lnRef>
+          <a:fillRef idx="0">
+            <a:schemeClr val="accent1"/>
+          </a:fillRef>
+          <a:effectRef idx="1">
+            <a:schemeClr val="accent1"/>
+          </a:effectRef>
+          <a:fontRef idx="minor">
+            <a:schemeClr val="tx1"/>
+          </a:fontRef>
+        </p:style>
+      </p:cxnSp>
+      <p:cxnSp>
+        <p:nvCxnSpPr>
+          <p:cNvPr id="41" name="Gerader Verbinder 40">
+            <a:extLst>
+              <a:ext uri="{FF2B5EF4-FFF2-40B4-BE49-F238E27FC236}">
+                <a16:creationId xmlns:a16="http://schemas.microsoft.com/office/drawing/2014/main" id="{4A804FDA-53C5-1EB3-645C-8CE175B89726}"/>
+              </a:ext>
+            </a:extLst>
+          </p:cNvPr>
+          <p:cNvCxnSpPr>
+            <a:cxnSpLocks/>
+          </p:cNvCxnSpPr>
+          <p:nvPr/>
+        </p:nvCxnSpPr>
+        <p:spPr>
+          <a:xfrm flipH="1">
+            <a:off x="8387200" y="1306532"/>
+            <a:ext cx="94376" cy="0"/>
+          </a:xfrm>
+          <a:prstGeom prst="line">
+            <a:avLst/>
+          </a:prstGeom>
+          <a:ln w="6350">
+            <a:solidFill>
+              <a:schemeClr val="bg1">
+                <a:lumMod val="50000"/>
+              </a:schemeClr>
+            </a:solidFill>
+          </a:ln>
+        </p:spPr>
+        <p:style>
+          <a:lnRef idx="2">
+            <a:schemeClr val="accent1"/>
+          </a:lnRef>
+          <a:fillRef idx="0">
+            <a:schemeClr val="accent1"/>
+          </a:fillRef>
+          <a:effectRef idx="1">
+            <a:schemeClr val="accent1"/>
+          </a:effectRef>
+          <a:fontRef idx="minor">
+            <a:schemeClr val="tx1"/>
+          </a:fontRef>
+        </p:style>
+      </p:cxnSp>
+      <p:cxnSp>
+        <p:nvCxnSpPr>
+          <p:cNvPr id="42" name="Gerader Verbinder 41">
+            <a:extLst>
+              <a:ext uri="{FF2B5EF4-FFF2-40B4-BE49-F238E27FC236}">
+                <a16:creationId xmlns:a16="http://schemas.microsoft.com/office/drawing/2014/main" id="{CEB28B13-3A71-875B-99A8-B2CBE079D70C}"/>
+              </a:ext>
+            </a:extLst>
+          </p:cNvPr>
+          <p:cNvCxnSpPr>
+            <a:cxnSpLocks/>
+          </p:cNvCxnSpPr>
+          <p:nvPr/>
+        </p:nvCxnSpPr>
+        <p:spPr>
+          <a:xfrm flipH="1">
+            <a:off x="8387200" y="2846858"/>
+            <a:ext cx="94376" cy="0"/>
+          </a:xfrm>
+          <a:prstGeom prst="line">
+            <a:avLst/>
+          </a:prstGeom>
+          <a:ln w="6350">
+            <a:solidFill>
+              <a:schemeClr val="bg1">
+                <a:lumMod val="50000"/>
+              </a:schemeClr>
+            </a:solidFill>
+          </a:ln>
+        </p:spPr>
+        <p:style>
+          <a:lnRef idx="2">
+            <a:schemeClr val="accent1"/>
+          </a:lnRef>
+          <a:fillRef idx="0">
+            <a:schemeClr val="accent1"/>
+          </a:fillRef>
+          <a:effectRef idx="1">
+            <a:schemeClr val="accent1"/>
+          </a:effectRef>
+          <a:fontRef idx="minor">
+            <a:schemeClr val="tx1"/>
+          </a:fontRef>
+        </p:style>
+      </p:cxnSp>
+      <p:cxnSp>
+        <p:nvCxnSpPr>
+          <p:cNvPr id="43" name="Gerader Verbinder 42">
+            <a:extLst>
+              <a:ext uri="{FF2B5EF4-FFF2-40B4-BE49-F238E27FC236}">
+                <a16:creationId xmlns:a16="http://schemas.microsoft.com/office/drawing/2014/main" id="{2199CA56-0D1D-27A4-4BE7-408BD72CAFCE}"/>
+              </a:ext>
+            </a:extLst>
+          </p:cNvPr>
+          <p:cNvCxnSpPr>
+            <a:cxnSpLocks/>
+          </p:cNvCxnSpPr>
+          <p:nvPr/>
+        </p:nvCxnSpPr>
+        <p:spPr>
+          <a:xfrm flipH="1">
+            <a:off x="8387200" y="3025792"/>
+            <a:ext cx="94376" cy="0"/>
+          </a:xfrm>
+          <a:prstGeom prst="line">
+            <a:avLst/>
+          </a:prstGeom>
+          <a:ln w="6350">
+            <a:solidFill>
+              <a:schemeClr val="bg1">
+                <a:lumMod val="50000"/>
+              </a:schemeClr>
+            </a:solidFill>
+          </a:ln>
+        </p:spPr>
+        <p:style>
+          <a:lnRef idx="2">
+            <a:schemeClr val="accent1"/>
+          </a:lnRef>
+          <a:fillRef idx="0">
+            <a:schemeClr val="accent1"/>
+          </a:fillRef>
+          <a:effectRef idx="1">
+            <a:schemeClr val="accent1"/>
+          </a:effectRef>
+          <a:fontRef idx="minor">
+            <a:schemeClr val="tx1"/>
+          </a:fontRef>
+        </p:style>
+      </p:cxnSp>
+      <p:sp>
+        <p:nvSpPr>
+          <p:cNvPr id="44" name="Textfeld 43">
+            <a:extLst>
+              <a:ext uri="{FF2B5EF4-FFF2-40B4-BE49-F238E27FC236}">
+                <a16:creationId xmlns:a16="http://schemas.microsoft.com/office/drawing/2014/main" id="{F6EC403E-7154-55A0-B12F-F2FC79DD9D2A}"/>
+              </a:ext>
+            </a:extLst>
+          </p:cNvPr>
+          <p:cNvSpPr txBox="1"/>
+          <p:nvPr/>
+        </p:nvSpPr>
+        <p:spPr>
+          <a:xfrm>
+            <a:off x="8104750" y="986999"/>
+            <a:ext cx="282450" cy="246221"/>
+          </a:xfrm>
+          <a:prstGeom prst="rect">
+            <a:avLst/>
+          </a:prstGeom>
+          <a:noFill/>
+        </p:spPr>
+        <p:txBody>
+          <a:bodyPr wrap="none" rtlCol="0">
+            <a:spAutoFit/>
+          </a:bodyPr>
+          <a:lstStyle/>
+          <a:p>
+            <a:r>
+              <a:rPr lang="de-DE" sz="1000" dirty="0">
+                <a:solidFill>
+                  <a:schemeClr val="bg1">
+                    <a:lumMod val="75000"/>
+                  </a:schemeClr>
+                </a:solidFill>
+                <a:latin typeface="Roboto" panose="02000000000000000000" pitchFamily="2" charset="0"/>
+                <a:ea typeface="Roboto" panose="02000000000000000000" pitchFamily="2" charset="0"/>
+                <a:cs typeface="Roboto" panose="02000000000000000000" pitchFamily="2" charset="0"/>
+              </a:rPr>
+              <a:t>cl</a:t>
+            </a:r>
+            <a:endParaRPr lang="en-US" sz="1000" dirty="0">
+              <a:solidFill>
+                <a:schemeClr val="bg1">
+                  <a:lumMod val="75000"/>
+                </a:schemeClr>
+              </a:solidFill>
+              <a:latin typeface="Roboto" panose="02000000000000000000" pitchFamily="2" charset="0"/>
+              <a:ea typeface="Roboto" panose="02000000000000000000" pitchFamily="2" charset="0"/>
+              <a:cs typeface="Roboto" panose="02000000000000000000" pitchFamily="2" charset="0"/>
+            </a:endParaRPr>
+          </a:p>
+        </p:txBody>
+      </p:sp>
+      <p:sp>
+        <p:nvSpPr>
+          <p:cNvPr id="45" name="Textfeld 44">
+            <a:extLst>
+              <a:ext uri="{FF2B5EF4-FFF2-40B4-BE49-F238E27FC236}">
+                <a16:creationId xmlns:a16="http://schemas.microsoft.com/office/drawing/2014/main" id="{B2A16C40-8CBB-36F5-58A3-FB5F7F38A918}"/>
+              </a:ext>
+            </a:extLst>
+          </p:cNvPr>
+          <p:cNvSpPr txBox="1"/>
+          <p:nvPr/>
+        </p:nvSpPr>
+        <p:spPr>
+          <a:xfrm>
+            <a:off x="10226295" y="2635223"/>
+            <a:ext cx="498855" cy="246221"/>
+          </a:xfrm>
+          <a:prstGeom prst="rect">
+            <a:avLst/>
+          </a:prstGeom>
+          <a:noFill/>
+        </p:spPr>
+        <p:txBody>
+          <a:bodyPr wrap="none" rtlCol="0">
+            <a:spAutoFit/>
+          </a:bodyPr>
+          <a:lstStyle/>
+          <a:p>
+            <a:r>
+              <a:rPr lang="de-DE" sz="1000" dirty="0">
+                <a:solidFill>
+                  <a:schemeClr val="bg1">
+                    <a:lumMod val="75000"/>
+                  </a:schemeClr>
+                </a:solidFill>
+                <a:latin typeface="Roboto" panose="02000000000000000000" pitchFamily="2" charset="0"/>
+                <a:ea typeface="Roboto" panose="02000000000000000000" pitchFamily="2" charset="0"/>
+                <a:cs typeface="Roboto" panose="02000000000000000000" pitchFamily="2" charset="0"/>
+              </a:rPr>
+              <a:t>alpha</a:t>
+            </a:r>
+            <a:endParaRPr lang="en-US" sz="1000" dirty="0">
+              <a:solidFill>
+                <a:schemeClr val="bg1">
+                  <a:lumMod val="75000"/>
+                </a:schemeClr>
+              </a:solidFill>
+              <a:latin typeface="Roboto" panose="02000000000000000000" pitchFamily="2" charset="0"/>
+              <a:ea typeface="Roboto" panose="02000000000000000000" pitchFamily="2" charset="0"/>
+              <a:cs typeface="Roboto" panose="02000000000000000000" pitchFamily="2" charset="0"/>
+            </a:endParaRPr>
+          </a:p>
+        </p:txBody>
+      </p:sp>
+      <p:sp>
+        <p:nvSpPr>
+          <p:cNvPr id="59" name="Textfeld 58">
+            <a:extLst>
+              <a:ext uri="{FF2B5EF4-FFF2-40B4-BE49-F238E27FC236}">
+                <a16:creationId xmlns:a16="http://schemas.microsoft.com/office/drawing/2014/main" id="{A7948AAE-E0F3-43AF-71D9-56D75F352F68}"/>
+              </a:ext>
+            </a:extLst>
+          </p:cNvPr>
+          <p:cNvSpPr txBox="1"/>
+          <p:nvPr/>
+        </p:nvSpPr>
+        <p:spPr>
+          <a:xfrm>
+            <a:off x="8336446" y="2621125"/>
+            <a:ext cx="229553" cy="226591"/>
+          </a:xfrm>
+          <a:prstGeom prst="rect">
+            <a:avLst/>
+          </a:prstGeom>
+          <a:solidFill>
+            <a:schemeClr val="tx1">
+              <a:alpha val="78000"/>
+            </a:schemeClr>
+          </a:solidFill>
+        </p:spPr>
+        <p:txBody>
+          <a:bodyPr wrap="square" lIns="36000" tIns="36000" rIns="36000" bIns="36000" rtlCol="0">
+            <a:spAutoFit/>
+          </a:bodyPr>
+          <a:lstStyle/>
+          <a:p>
+            <a:pPr algn="ctr"/>
+            <a:r>
+              <a:rPr lang="de-DE" sz="1000" dirty="0">
+                <a:solidFill>
+                  <a:schemeClr val="accent4"/>
+                </a:solidFill>
+                <a:latin typeface="Roboto" panose="02000000000000000000" pitchFamily="2" charset="0"/>
+                <a:ea typeface="Roboto" panose="02000000000000000000" pitchFamily="2" charset="0"/>
+                <a:cs typeface="Roboto" panose="02000000000000000000" pitchFamily="2" charset="0"/>
+              </a:rPr>
+              <a:t>0°</a:t>
+            </a:r>
+            <a:endParaRPr lang="en-US" sz="1000" dirty="0">
+              <a:solidFill>
+                <a:schemeClr val="accent4"/>
+              </a:solidFill>
+              <a:latin typeface="Roboto" panose="02000000000000000000" pitchFamily="2" charset="0"/>
+              <a:ea typeface="Roboto" panose="02000000000000000000" pitchFamily="2" charset="0"/>
+              <a:cs typeface="Roboto" panose="02000000000000000000" pitchFamily="2" charset="0"/>
+            </a:endParaRPr>
+          </a:p>
+        </p:txBody>
+      </p:sp>
+      <p:cxnSp>
+        <p:nvCxnSpPr>
+          <p:cNvPr id="47" name="Gerader Verbinder 46">
+            <a:extLst>
+              <a:ext uri="{FF2B5EF4-FFF2-40B4-BE49-F238E27FC236}">
+                <a16:creationId xmlns:a16="http://schemas.microsoft.com/office/drawing/2014/main" id="{CB69D7E8-25F2-AD43-BEB2-1C2E80A43EAB}"/>
+              </a:ext>
+            </a:extLst>
+          </p:cNvPr>
+          <p:cNvCxnSpPr>
+            <a:cxnSpLocks/>
+          </p:cNvCxnSpPr>
+          <p:nvPr/>
+        </p:nvCxnSpPr>
+        <p:spPr>
+          <a:xfrm flipH="1">
+            <a:off x="8387200" y="1082290"/>
+            <a:ext cx="94376" cy="0"/>
+          </a:xfrm>
+          <a:prstGeom prst="line">
+            <a:avLst/>
+          </a:prstGeom>
+          <a:ln w="6350">
+            <a:solidFill>
+              <a:schemeClr val="bg1">
+                <a:lumMod val="50000"/>
+              </a:schemeClr>
+            </a:solidFill>
+          </a:ln>
+        </p:spPr>
+        <p:style>
+          <a:lnRef idx="2">
+            <a:schemeClr val="accent1"/>
+          </a:lnRef>
+          <a:fillRef idx="0">
+            <a:schemeClr val="accent1"/>
+          </a:fillRef>
+          <a:effectRef idx="1">
+            <a:schemeClr val="accent1"/>
+          </a:effectRef>
+          <a:fontRef idx="minor">
+            <a:schemeClr val="tx1"/>
+          </a:fontRef>
+        </p:style>
+      </p:cxnSp>
+      <p:sp>
+        <p:nvSpPr>
+          <p:cNvPr id="60" name="Textfeld 59">
+            <a:extLst>
+              <a:ext uri="{FF2B5EF4-FFF2-40B4-BE49-F238E27FC236}">
+                <a16:creationId xmlns:a16="http://schemas.microsoft.com/office/drawing/2014/main" id="{02866241-2F29-C6CF-73A2-B7DD75504048}"/>
+              </a:ext>
+            </a:extLst>
+          </p:cNvPr>
+          <p:cNvSpPr txBox="1"/>
+          <p:nvPr/>
+        </p:nvSpPr>
+        <p:spPr>
+          <a:xfrm>
+            <a:off x="7852394" y="2617948"/>
+            <a:ext cx="371441" cy="226591"/>
+          </a:xfrm>
+          <a:prstGeom prst="rect">
+            <a:avLst/>
+          </a:prstGeom>
+          <a:solidFill>
+            <a:schemeClr val="tx1">
+              <a:alpha val="78000"/>
+            </a:schemeClr>
+          </a:solidFill>
+        </p:spPr>
+        <p:txBody>
+          <a:bodyPr wrap="square" lIns="36000" tIns="36000" rIns="36000" bIns="36000" rtlCol="0">
+            <a:spAutoFit/>
+          </a:bodyPr>
+          <a:lstStyle/>
+          <a:p>
+            <a:pPr algn="ctr"/>
+            <a:r>
+              <a:rPr lang="de-DE" sz="1000" dirty="0">
+                <a:solidFill>
+                  <a:srgbClr val="C00000"/>
+                </a:solidFill>
+                <a:latin typeface="Roboto" panose="02000000000000000000" pitchFamily="2" charset="0"/>
+                <a:ea typeface="Roboto" panose="02000000000000000000" pitchFamily="2" charset="0"/>
+                <a:cs typeface="Roboto" panose="02000000000000000000" pitchFamily="2" charset="0"/>
+              </a:rPr>
+              <a:t>-1,5°</a:t>
+            </a:r>
+            <a:endParaRPr lang="en-US" sz="1000" dirty="0">
+              <a:solidFill>
+                <a:srgbClr val="C00000"/>
+              </a:solidFill>
+              <a:latin typeface="Roboto" panose="02000000000000000000" pitchFamily="2" charset="0"/>
+              <a:ea typeface="Roboto" panose="02000000000000000000" pitchFamily="2" charset="0"/>
+              <a:cs typeface="Roboto" panose="02000000000000000000" pitchFamily="2" charset="0"/>
+            </a:endParaRPr>
+          </a:p>
+        </p:txBody>
+      </p:sp>
+      <p:cxnSp>
+        <p:nvCxnSpPr>
+          <p:cNvPr id="49" name="Gerader Verbinder 48">
+            <a:extLst>
+              <a:ext uri="{FF2B5EF4-FFF2-40B4-BE49-F238E27FC236}">
+                <a16:creationId xmlns:a16="http://schemas.microsoft.com/office/drawing/2014/main" id="{130FF87C-7414-7417-EDEB-201E39BA0FC9}"/>
+              </a:ext>
+            </a:extLst>
+          </p:cNvPr>
+          <p:cNvCxnSpPr>
+            <a:cxnSpLocks/>
+          </p:cNvCxnSpPr>
+          <p:nvPr/>
+        </p:nvCxnSpPr>
+        <p:spPr>
+          <a:xfrm flipV="1">
+            <a:off x="7975600" y="1145469"/>
+            <a:ext cx="2039076" cy="1800929"/>
+          </a:xfrm>
+          <a:prstGeom prst="line">
+            <a:avLst/>
+          </a:prstGeom>
+          <a:ln w="12700">
+            <a:solidFill>
+              <a:schemeClr val="accent4"/>
+            </a:solidFill>
+          </a:ln>
+        </p:spPr>
+        <p:style>
+          <a:lnRef idx="2">
+            <a:schemeClr val="accent1"/>
+          </a:lnRef>
+          <a:fillRef idx="0">
+            <a:schemeClr val="accent1"/>
+          </a:fillRef>
+          <a:effectRef idx="1">
+            <a:schemeClr val="accent1"/>
+          </a:effectRef>
+          <a:fontRef idx="minor">
+            <a:schemeClr val="tx1"/>
+          </a:fontRef>
+        </p:style>
+      </p:cxnSp>
+      <p:sp>
+        <p:nvSpPr>
+          <p:cNvPr id="61" name="Textfeld 60">
+            <a:extLst>
+              <a:ext uri="{FF2B5EF4-FFF2-40B4-BE49-F238E27FC236}">
+                <a16:creationId xmlns:a16="http://schemas.microsoft.com/office/drawing/2014/main" id="{ED7A73F8-1B0D-B87F-BE69-375B8F5051E8}"/>
+              </a:ext>
+            </a:extLst>
+          </p:cNvPr>
+          <p:cNvSpPr txBox="1"/>
+          <p:nvPr/>
+        </p:nvSpPr>
+        <p:spPr>
+          <a:xfrm>
+            <a:off x="7483189" y="2606270"/>
+            <a:ext cx="313068" cy="226591"/>
+          </a:xfrm>
+          <a:prstGeom prst="rect">
+            <a:avLst/>
+          </a:prstGeom>
+          <a:solidFill>
+            <a:schemeClr val="tx1">
+              <a:alpha val="78000"/>
+            </a:schemeClr>
+          </a:solidFill>
+        </p:spPr>
+        <p:txBody>
+          <a:bodyPr wrap="square" lIns="36000" tIns="36000" rIns="36000" bIns="36000" rtlCol="0">
+            <a:spAutoFit/>
+          </a:bodyPr>
+          <a:lstStyle/>
+          <a:p>
+            <a:pPr algn="ctr"/>
+            <a:r>
+              <a:rPr lang="de-DE" sz="1000" dirty="0">
+                <a:solidFill>
+                  <a:schemeClr val="accent6"/>
+                </a:solidFill>
+                <a:latin typeface="Roboto" panose="02000000000000000000" pitchFamily="2" charset="0"/>
+                <a:ea typeface="Roboto" panose="02000000000000000000" pitchFamily="2" charset="0"/>
+                <a:cs typeface="Roboto" panose="02000000000000000000" pitchFamily="2" charset="0"/>
+              </a:rPr>
+              <a:t>-3°</a:t>
+            </a:r>
+            <a:endParaRPr lang="en-US" sz="1000" dirty="0">
+              <a:solidFill>
+                <a:schemeClr val="accent6"/>
+              </a:solidFill>
+              <a:latin typeface="Roboto" panose="02000000000000000000" pitchFamily="2" charset="0"/>
+              <a:ea typeface="Roboto" panose="02000000000000000000" pitchFamily="2" charset="0"/>
+              <a:cs typeface="Roboto" panose="02000000000000000000" pitchFamily="2" charset="0"/>
+            </a:endParaRPr>
+          </a:p>
+        </p:txBody>
+      </p:sp>
+      <p:cxnSp>
+        <p:nvCxnSpPr>
+          <p:cNvPr id="53" name="Gerader Verbinder 52">
+            <a:extLst>
+              <a:ext uri="{FF2B5EF4-FFF2-40B4-BE49-F238E27FC236}">
+                <a16:creationId xmlns:a16="http://schemas.microsoft.com/office/drawing/2014/main" id="{E3A9F527-B506-E2EE-64BE-AEEC69FA4793}"/>
+              </a:ext>
+            </a:extLst>
+          </p:cNvPr>
+          <p:cNvCxnSpPr>
+            <a:cxnSpLocks/>
+          </p:cNvCxnSpPr>
+          <p:nvPr/>
+        </p:nvCxnSpPr>
+        <p:spPr>
+          <a:xfrm flipV="1">
+            <a:off x="7611320" y="1104626"/>
+            <a:ext cx="2039076" cy="1800929"/>
+          </a:xfrm>
+          <a:prstGeom prst="line">
+            <a:avLst/>
+          </a:prstGeom>
+          <a:ln w="12700">
+            <a:solidFill>
+              <a:srgbClr val="C00000"/>
+            </a:solidFill>
+          </a:ln>
+        </p:spPr>
+        <p:style>
+          <a:lnRef idx="2">
+            <a:schemeClr val="accent1"/>
+          </a:lnRef>
+          <a:fillRef idx="0">
+            <a:schemeClr val="accent1"/>
+          </a:fillRef>
+          <a:effectRef idx="1">
+            <a:schemeClr val="accent1"/>
+          </a:effectRef>
+          <a:fontRef idx="minor">
+            <a:schemeClr val="tx1"/>
+          </a:fontRef>
+        </p:style>
+      </p:cxnSp>
+      <p:cxnSp>
+        <p:nvCxnSpPr>
+          <p:cNvPr id="54" name="Gerader Verbinder 53">
+            <a:extLst>
+              <a:ext uri="{FF2B5EF4-FFF2-40B4-BE49-F238E27FC236}">
+                <a16:creationId xmlns:a16="http://schemas.microsoft.com/office/drawing/2014/main" id="{8D739E4C-3A15-01AA-631B-AFBD237E8585}"/>
+              </a:ext>
+            </a:extLst>
+          </p:cNvPr>
+          <p:cNvCxnSpPr>
+            <a:cxnSpLocks/>
+          </p:cNvCxnSpPr>
+          <p:nvPr/>
+        </p:nvCxnSpPr>
+        <p:spPr>
+          <a:xfrm flipV="1">
+            <a:off x="7370899" y="1063783"/>
+            <a:ext cx="1915217" cy="1691536"/>
+          </a:xfrm>
+          <a:prstGeom prst="line">
+            <a:avLst/>
+          </a:prstGeom>
+          <a:ln w="12700">
+            <a:solidFill>
+              <a:schemeClr val="accent6"/>
+            </a:solidFill>
+          </a:ln>
+        </p:spPr>
+        <p:style>
+          <a:lnRef idx="2">
+            <a:schemeClr val="accent1"/>
+          </a:lnRef>
+          <a:fillRef idx="0">
+            <a:schemeClr val="accent1"/>
+          </a:fillRef>
+          <a:effectRef idx="1">
+            <a:schemeClr val="accent1"/>
+          </a:effectRef>
+          <a:fontRef idx="minor">
+            <a:schemeClr val="tx1"/>
+          </a:fontRef>
+        </p:style>
+      </p:cxnSp>
+      <p:sp>
+        <p:nvSpPr>
+          <p:cNvPr id="56" name="Textfeld 55">
+            <a:extLst>
+              <a:ext uri="{FF2B5EF4-FFF2-40B4-BE49-F238E27FC236}">
+                <a16:creationId xmlns:a16="http://schemas.microsoft.com/office/drawing/2014/main" id="{1891AF06-8B88-68AC-EDCF-F2084C98E83F}"/>
+              </a:ext>
+            </a:extLst>
+          </p:cNvPr>
+          <p:cNvSpPr txBox="1"/>
+          <p:nvPr/>
+        </p:nvSpPr>
+        <p:spPr>
+          <a:xfrm>
+            <a:off x="9693277" y="1334913"/>
+            <a:ext cx="670376" cy="230832"/>
+          </a:xfrm>
+          <a:prstGeom prst="rect">
+            <a:avLst/>
+          </a:prstGeom>
+          <a:noFill/>
+        </p:spPr>
+        <p:txBody>
+          <a:bodyPr wrap="none" rtlCol="0">
+            <a:spAutoFit/>
+          </a:bodyPr>
+          <a:lstStyle/>
+          <a:p>
+            <a:r>
+              <a:rPr lang="de-DE" sz="900" dirty="0">
+                <a:solidFill>
+                  <a:schemeClr val="accent4"/>
+                </a:solidFill>
+                <a:latin typeface="Roboto" panose="02000000000000000000" pitchFamily="2" charset="0"/>
+                <a:ea typeface="Roboto" panose="02000000000000000000" pitchFamily="2" charset="0"/>
+                <a:cs typeface="Roboto" panose="02000000000000000000" pitchFamily="2" charset="0"/>
+              </a:rPr>
+              <a:t>Flat Plate</a:t>
+            </a:r>
+            <a:endParaRPr lang="en-US" sz="900" dirty="0">
+              <a:solidFill>
+                <a:schemeClr val="accent4"/>
+              </a:solidFill>
+              <a:latin typeface="Roboto" panose="02000000000000000000" pitchFamily="2" charset="0"/>
+              <a:ea typeface="Roboto" panose="02000000000000000000" pitchFamily="2" charset="0"/>
+              <a:cs typeface="Roboto" panose="02000000000000000000" pitchFamily="2" charset="0"/>
+            </a:endParaRPr>
+          </a:p>
+        </p:txBody>
+      </p:sp>
+      <p:sp>
+        <p:nvSpPr>
+          <p:cNvPr id="57" name="Textfeld 56">
+            <a:extLst>
+              <a:ext uri="{FF2B5EF4-FFF2-40B4-BE49-F238E27FC236}">
+                <a16:creationId xmlns:a16="http://schemas.microsoft.com/office/drawing/2014/main" id="{CC311D35-8867-B541-AD01-80C0EFDFB617}"/>
+              </a:ext>
+            </a:extLst>
+          </p:cNvPr>
+          <p:cNvSpPr txBox="1"/>
+          <p:nvPr/>
+        </p:nvSpPr>
+        <p:spPr>
+          <a:xfrm>
+            <a:off x="9431671" y="1156056"/>
+            <a:ext cx="774571" cy="230832"/>
+          </a:xfrm>
+          <a:prstGeom prst="rect">
+            <a:avLst/>
+          </a:prstGeom>
+          <a:solidFill>
+            <a:schemeClr val="tx1">
+              <a:alpha val="60000"/>
+            </a:schemeClr>
+          </a:solidFill>
+        </p:spPr>
+        <p:txBody>
+          <a:bodyPr wrap="none" rtlCol="0">
+            <a:spAutoFit/>
+          </a:bodyPr>
+          <a:lstStyle/>
+          <a:p>
+            <a:r>
+              <a:rPr lang="de-DE" sz="900" dirty="0" err="1">
+                <a:solidFill>
+                  <a:srgbClr val="C00000"/>
+                </a:solidFill>
+                <a:latin typeface="Roboto" panose="02000000000000000000" pitchFamily="2" charset="0"/>
+                <a:ea typeface="Roboto" panose="02000000000000000000" pitchFamily="2" charset="0"/>
+                <a:cs typeface="Roboto" panose="02000000000000000000" pitchFamily="2" charset="0"/>
+              </a:rPr>
+              <a:t>Race</a:t>
+            </a:r>
+            <a:r>
+              <a:rPr lang="de-DE" sz="900" dirty="0">
+                <a:solidFill>
+                  <a:srgbClr val="C00000"/>
+                </a:solidFill>
+                <a:latin typeface="Roboto" panose="02000000000000000000" pitchFamily="2" charset="0"/>
+                <a:ea typeface="Roboto" panose="02000000000000000000" pitchFamily="2" charset="0"/>
+                <a:cs typeface="Roboto" panose="02000000000000000000" pitchFamily="2" charset="0"/>
+              </a:rPr>
+              <a:t> Airfoil</a:t>
+            </a:r>
+            <a:endParaRPr lang="en-US" sz="900" dirty="0">
+              <a:solidFill>
+                <a:srgbClr val="C00000"/>
+              </a:solidFill>
+              <a:latin typeface="Roboto" panose="02000000000000000000" pitchFamily="2" charset="0"/>
+              <a:ea typeface="Roboto" panose="02000000000000000000" pitchFamily="2" charset="0"/>
+              <a:cs typeface="Roboto" panose="02000000000000000000" pitchFamily="2" charset="0"/>
+            </a:endParaRPr>
+          </a:p>
+        </p:txBody>
+      </p:sp>
+      <p:sp>
+        <p:nvSpPr>
+          <p:cNvPr id="58" name="Textfeld 57">
+            <a:extLst>
+              <a:ext uri="{FF2B5EF4-FFF2-40B4-BE49-F238E27FC236}">
+                <a16:creationId xmlns:a16="http://schemas.microsoft.com/office/drawing/2014/main" id="{30D5BE67-9127-836C-9916-DB14FEFE352B}"/>
+              </a:ext>
+            </a:extLst>
+          </p:cNvPr>
+          <p:cNvSpPr txBox="1"/>
+          <p:nvPr/>
+        </p:nvSpPr>
+        <p:spPr>
+          <a:xfrm>
+            <a:off x="9230818" y="939170"/>
+            <a:ext cx="944489" cy="230832"/>
+          </a:xfrm>
+          <a:prstGeom prst="rect">
+            <a:avLst/>
+          </a:prstGeom>
+          <a:solidFill>
+            <a:schemeClr val="tx1">
+              <a:alpha val="60000"/>
+            </a:schemeClr>
+          </a:solidFill>
+        </p:spPr>
+        <p:txBody>
+          <a:bodyPr wrap="none" rtlCol="0">
+            <a:spAutoFit/>
+          </a:bodyPr>
+          <a:lstStyle/>
+          <a:p>
+            <a:r>
+              <a:rPr lang="de-DE" sz="900" dirty="0">
+                <a:solidFill>
+                  <a:schemeClr val="accent6"/>
+                </a:solidFill>
+                <a:latin typeface="Roboto" panose="02000000000000000000" pitchFamily="2" charset="0"/>
+                <a:ea typeface="Roboto" panose="02000000000000000000" pitchFamily="2" charset="0"/>
+                <a:cs typeface="Roboto" panose="02000000000000000000" pitchFamily="2" charset="0"/>
+              </a:rPr>
+              <a:t>Thermal Airfoil</a:t>
+            </a:r>
+            <a:endParaRPr lang="en-US" sz="900" dirty="0">
+              <a:solidFill>
+                <a:schemeClr val="accent6"/>
+              </a:solidFill>
+              <a:latin typeface="Roboto" panose="02000000000000000000" pitchFamily="2" charset="0"/>
+              <a:ea typeface="Roboto" panose="02000000000000000000" pitchFamily="2" charset="0"/>
+              <a:cs typeface="Roboto" panose="02000000000000000000" pitchFamily="2" charset="0"/>
+            </a:endParaRPr>
+          </a:p>
+        </p:txBody>
+      </p:sp>
+      <p:sp>
+        <p:nvSpPr>
+          <p:cNvPr id="62" name="Ellipse 61">
+            <a:extLst>
+              <a:ext uri="{FF2B5EF4-FFF2-40B4-BE49-F238E27FC236}">
+                <a16:creationId xmlns:a16="http://schemas.microsoft.com/office/drawing/2014/main" id="{DB0DC564-B229-F4F2-2C63-A2E3C1F1E94B}"/>
+              </a:ext>
+            </a:extLst>
+          </p:cNvPr>
+          <p:cNvSpPr>
+            <a:spLocks noChangeAspect="1"/>
+          </p:cNvSpPr>
+          <p:nvPr/>
+        </p:nvSpPr>
+        <p:spPr>
+          <a:xfrm>
+            <a:off x="7594869" y="2498725"/>
+            <a:ext cx="74095" cy="74095"/>
+          </a:xfrm>
+          <a:prstGeom prst="ellipse">
+            <a:avLst/>
+          </a:prstGeom>
+          <a:solidFill>
+            <a:schemeClr val="accent6"/>
+          </a:solidFill>
+          <a:ln>
+            <a:noFill/>
+          </a:ln>
+        </p:spPr>
+        <p:style>
+          <a:lnRef idx="2">
+            <a:schemeClr val="accent1">
+              <a:shade val="15000"/>
+            </a:schemeClr>
+          </a:lnRef>
+          <a:fillRef idx="1">
+            <a:schemeClr val="accent1"/>
+          </a:fillRef>
+          <a:effectRef idx="0">
+            <a:schemeClr val="accent1"/>
+          </a:effectRef>
+          <a:fontRef idx="minor">
+            <a:schemeClr val="lt1"/>
+          </a:fontRef>
+        </p:style>
+        <p:txBody>
+          <a:bodyPr rtlCol="0" anchor="ctr"/>
+          <a:lstStyle/>
+          <a:p>
+            <a:pPr algn="ctr"/>
+            <a:endParaRPr lang="en-US"/>
+          </a:p>
+        </p:txBody>
+      </p:sp>
+      <p:sp>
+        <p:nvSpPr>
+          <p:cNvPr id="63" name="Ellipse 62">
+            <a:extLst>
+              <a:ext uri="{FF2B5EF4-FFF2-40B4-BE49-F238E27FC236}">
+                <a16:creationId xmlns:a16="http://schemas.microsoft.com/office/drawing/2014/main" id="{275B578A-D5F2-9CDB-6BA1-1384D6FF5F59}"/>
+              </a:ext>
+            </a:extLst>
+          </p:cNvPr>
+          <p:cNvSpPr>
+            <a:spLocks noChangeAspect="1"/>
+          </p:cNvSpPr>
+          <p:nvPr/>
+        </p:nvSpPr>
+        <p:spPr>
+          <a:xfrm>
+            <a:off x="8000136" y="2496819"/>
+            <a:ext cx="74095" cy="74095"/>
+          </a:xfrm>
+          <a:prstGeom prst="ellipse">
+            <a:avLst/>
+          </a:prstGeom>
+          <a:solidFill>
+            <a:srgbClr val="C00000"/>
+          </a:solidFill>
+          <a:ln>
+            <a:noFill/>
+          </a:ln>
+        </p:spPr>
+        <p:style>
+          <a:lnRef idx="2">
+            <a:schemeClr val="accent1">
+              <a:shade val="15000"/>
+            </a:schemeClr>
+          </a:lnRef>
+          <a:fillRef idx="1">
+            <a:schemeClr val="accent1"/>
+          </a:fillRef>
+          <a:effectRef idx="0">
+            <a:schemeClr val="accent1"/>
+          </a:effectRef>
+          <a:fontRef idx="minor">
+            <a:schemeClr val="lt1"/>
+          </a:fontRef>
+        </p:style>
+        <p:txBody>
+          <a:bodyPr rtlCol="0" anchor="ctr"/>
+          <a:lstStyle/>
+          <a:p>
+            <a:pPr algn="ctr"/>
+            <a:endParaRPr lang="en-US"/>
+          </a:p>
+        </p:txBody>
+      </p:sp>
+      <p:sp>
+        <p:nvSpPr>
+          <p:cNvPr id="64" name="Ellipse 63">
+            <a:extLst>
+              <a:ext uri="{FF2B5EF4-FFF2-40B4-BE49-F238E27FC236}">
+                <a16:creationId xmlns:a16="http://schemas.microsoft.com/office/drawing/2014/main" id="{A45A44CD-FD2F-2625-1934-006E6DB42DCA}"/>
+              </a:ext>
+            </a:extLst>
+          </p:cNvPr>
+          <p:cNvSpPr>
+            <a:spLocks noChangeAspect="1"/>
+          </p:cNvSpPr>
+          <p:nvPr/>
+        </p:nvSpPr>
+        <p:spPr>
+          <a:xfrm>
+            <a:off x="8398260" y="2497294"/>
+            <a:ext cx="74095" cy="74095"/>
+          </a:xfrm>
+          <a:prstGeom prst="ellipse">
+            <a:avLst/>
+          </a:prstGeom>
+          <a:solidFill>
+            <a:schemeClr val="accent4"/>
+          </a:solidFill>
+          <a:ln>
+            <a:noFill/>
+          </a:ln>
+        </p:spPr>
+        <p:style>
+          <a:lnRef idx="2">
+            <a:schemeClr val="accent1">
+              <a:shade val="15000"/>
+            </a:schemeClr>
+          </a:lnRef>
+          <a:fillRef idx="1">
+            <a:schemeClr val="accent1"/>
+          </a:fillRef>
+          <a:effectRef idx="0">
+            <a:schemeClr val="accent1"/>
+          </a:effectRef>
+          <a:fontRef idx="minor">
+            <a:schemeClr val="lt1"/>
+          </a:fontRef>
+        </p:style>
+        <p:txBody>
+          <a:bodyPr rtlCol="0" anchor="ctr"/>
+          <a:lstStyle/>
+          <a:p>
+            <a:pPr algn="ctr"/>
+            <a:endParaRPr lang="en-US"/>
+          </a:p>
+        </p:txBody>
+      </p:sp>
+      <p:cxnSp>
+        <p:nvCxnSpPr>
+          <p:cNvPr id="65" name="Gerader Verbinder 64">
+            <a:extLst>
+              <a:ext uri="{FF2B5EF4-FFF2-40B4-BE49-F238E27FC236}">
+                <a16:creationId xmlns:a16="http://schemas.microsoft.com/office/drawing/2014/main" id="{A44B4E68-9354-5035-56A9-80AF1A931817}"/>
+              </a:ext>
+            </a:extLst>
+          </p:cNvPr>
+          <p:cNvCxnSpPr>
+            <a:cxnSpLocks/>
+          </p:cNvCxnSpPr>
+          <p:nvPr/>
+        </p:nvCxnSpPr>
+        <p:spPr>
+          <a:xfrm>
+            <a:off x="8940678" y="2097384"/>
+            <a:ext cx="566178" cy="0"/>
+          </a:xfrm>
+          <a:prstGeom prst="line">
+            <a:avLst/>
+          </a:prstGeom>
+          <a:ln w="6350">
+            <a:solidFill>
+              <a:schemeClr val="bg1">
+                <a:lumMod val="65000"/>
+              </a:schemeClr>
+            </a:solidFill>
+            <a:prstDash val="sysDash"/>
+          </a:ln>
+        </p:spPr>
+        <p:style>
+          <a:lnRef idx="2">
+            <a:schemeClr val="accent1"/>
+          </a:lnRef>
+          <a:fillRef idx="0">
+            <a:schemeClr val="accent1"/>
+          </a:fillRef>
+          <a:effectRef idx="1">
+            <a:schemeClr val="accent1"/>
+          </a:effectRef>
+          <a:fontRef idx="minor">
+            <a:schemeClr val="tx1"/>
+          </a:fontRef>
+        </p:style>
+      </p:cxnSp>
+      <p:cxnSp>
+        <p:nvCxnSpPr>
+          <p:cNvPr id="69" name="Gerader Verbinder 68">
+            <a:extLst>
+              <a:ext uri="{FF2B5EF4-FFF2-40B4-BE49-F238E27FC236}">
+                <a16:creationId xmlns:a16="http://schemas.microsoft.com/office/drawing/2014/main" id="{E3FE60BF-4743-821D-5663-244C92806FCC}"/>
+              </a:ext>
+            </a:extLst>
+          </p:cNvPr>
+          <p:cNvCxnSpPr>
+            <a:cxnSpLocks/>
+          </p:cNvCxnSpPr>
+          <p:nvPr/>
+        </p:nvCxnSpPr>
+        <p:spPr>
+          <a:xfrm flipV="1">
+            <a:off x="9506856" y="1619250"/>
+            <a:ext cx="0" cy="469908"/>
+          </a:xfrm>
+          <a:prstGeom prst="line">
+            <a:avLst/>
+          </a:prstGeom>
+          <a:ln w="6350">
+            <a:solidFill>
+              <a:schemeClr val="bg1">
+                <a:lumMod val="65000"/>
+              </a:schemeClr>
+            </a:solidFill>
+            <a:prstDash val="sysDash"/>
+          </a:ln>
+        </p:spPr>
+        <p:style>
+          <a:lnRef idx="2">
+            <a:schemeClr val="accent1"/>
+          </a:lnRef>
+          <a:fillRef idx="0">
+            <a:schemeClr val="accent1"/>
+          </a:fillRef>
+          <a:effectRef idx="1">
+            <a:schemeClr val="accent1"/>
+          </a:effectRef>
+          <a:fontRef idx="minor">
+            <a:schemeClr val="tx1"/>
+          </a:fontRef>
+        </p:style>
+      </p:cxnSp>
+      <p:sp>
+        <p:nvSpPr>
+          <p:cNvPr id="73" name="Textfeld 72">
+            <a:extLst>
+              <a:ext uri="{FF2B5EF4-FFF2-40B4-BE49-F238E27FC236}">
+                <a16:creationId xmlns:a16="http://schemas.microsoft.com/office/drawing/2014/main" id="{D09F7FDD-F0EE-4813-2FE0-1035A3CA0FAC}"/>
+              </a:ext>
+            </a:extLst>
+          </p:cNvPr>
+          <p:cNvSpPr txBox="1"/>
+          <p:nvPr/>
+        </p:nvSpPr>
+        <p:spPr>
+          <a:xfrm>
+            <a:off x="9489176" y="1781933"/>
+            <a:ext cx="354584" cy="246221"/>
+          </a:xfrm>
+          <a:prstGeom prst="rect">
+            <a:avLst/>
+          </a:prstGeom>
+          <a:noFill/>
+        </p:spPr>
+        <p:txBody>
+          <a:bodyPr wrap="none" rtlCol="0">
+            <a:spAutoFit/>
+          </a:bodyPr>
+          <a:lstStyle/>
+          <a:p>
+            <a:r>
+              <a:rPr lang="de-DE" sz="1000" dirty="0">
+                <a:solidFill>
+                  <a:schemeClr val="bg1">
+                    <a:lumMod val="65000"/>
+                  </a:schemeClr>
+                </a:solidFill>
+                <a:latin typeface="Roboto" panose="02000000000000000000" pitchFamily="2" charset="0"/>
+                <a:ea typeface="Roboto" panose="02000000000000000000" pitchFamily="2" charset="0"/>
+                <a:cs typeface="Roboto" panose="02000000000000000000" pitchFamily="2" charset="0"/>
+              </a:rPr>
+              <a:t>dcl</a:t>
+            </a:r>
+            <a:endParaRPr lang="en-US" sz="1000" dirty="0">
+              <a:solidFill>
+                <a:schemeClr val="bg1">
+                  <a:lumMod val="65000"/>
+                </a:schemeClr>
+              </a:solidFill>
+              <a:latin typeface="Roboto" panose="02000000000000000000" pitchFamily="2" charset="0"/>
+              <a:ea typeface="Roboto" panose="02000000000000000000" pitchFamily="2" charset="0"/>
+              <a:cs typeface="Roboto" panose="02000000000000000000" pitchFamily="2" charset="0"/>
+            </a:endParaRPr>
+          </a:p>
+        </p:txBody>
+      </p:sp>
+      <p:sp>
+        <p:nvSpPr>
+          <p:cNvPr id="74" name="Textfeld 73">
+            <a:extLst>
+              <a:ext uri="{FF2B5EF4-FFF2-40B4-BE49-F238E27FC236}">
+                <a16:creationId xmlns:a16="http://schemas.microsoft.com/office/drawing/2014/main" id="{DE092743-B3DC-80B2-5E24-0E74DEAA5535}"/>
+              </a:ext>
+            </a:extLst>
+          </p:cNvPr>
+          <p:cNvSpPr txBox="1"/>
+          <p:nvPr/>
+        </p:nvSpPr>
+        <p:spPr>
+          <a:xfrm>
+            <a:off x="8977582" y="2097384"/>
+            <a:ext cx="570990" cy="246221"/>
+          </a:xfrm>
+          <a:prstGeom prst="rect">
+            <a:avLst/>
+          </a:prstGeom>
+          <a:noFill/>
+        </p:spPr>
+        <p:txBody>
+          <a:bodyPr wrap="none" rtlCol="0">
+            <a:spAutoFit/>
+          </a:bodyPr>
+          <a:lstStyle/>
+          <a:p>
+            <a:r>
+              <a:rPr lang="de-DE" sz="1000" dirty="0">
+                <a:solidFill>
+                  <a:schemeClr val="bg1">
+                    <a:lumMod val="65000"/>
+                  </a:schemeClr>
+                </a:solidFill>
+                <a:latin typeface="Roboto" panose="02000000000000000000" pitchFamily="2" charset="0"/>
+                <a:ea typeface="Roboto" panose="02000000000000000000" pitchFamily="2" charset="0"/>
+                <a:cs typeface="Roboto" panose="02000000000000000000" pitchFamily="2" charset="0"/>
+              </a:rPr>
+              <a:t>dalpha</a:t>
+            </a:r>
+            <a:endParaRPr lang="en-US" sz="1000" dirty="0">
+              <a:solidFill>
+                <a:schemeClr val="bg1">
+                  <a:lumMod val="65000"/>
+                </a:schemeClr>
+              </a:solidFill>
+              <a:latin typeface="Roboto" panose="02000000000000000000" pitchFamily="2" charset="0"/>
+              <a:ea typeface="Roboto" panose="02000000000000000000" pitchFamily="2" charset="0"/>
+              <a:cs typeface="Roboto" panose="02000000000000000000" pitchFamily="2" charset="0"/>
+            </a:endParaRPr>
+          </a:p>
+        </p:txBody>
+      </p:sp>
+      <p:sp>
+        <p:nvSpPr>
+          <p:cNvPr id="75" name="Textfeld 74">
+            <a:extLst>
+              <a:ext uri="{FF2B5EF4-FFF2-40B4-BE49-F238E27FC236}">
+                <a16:creationId xmlns:a16="http://schemas.microsoft.com/office/drawing/2014/main" id="{BB8A27CC-6BB4-D0D6-B505-976ACDD13A3D}"/>
+              </a:ext>
+            </a:extLst>
+          </p:cNvPr>
+          <p:cNvSpPr txBox="1"/>
+          <p:nvPr/>
+        </p:nvSpPr>
+        <p:spPr>
+          <a:xfrm>
+            <a:off x="7426287" y="2879618"/>
+            <a:ext cx="807595" cy="200055"/>
+          </a:xfrm>
+          <a:prstGeom prst="rect">
+            <a:avLst/>
+          </a:prstGeom>
+          <a:solidFill>
+            <a:srgbClr val="C00000"/>
+          </a:solidFill>
+        </p:spPr>
+        <p:txBody>
+          <a:bodyPr wrap="square" lIns="36000" rIns="36000" rtlCol="0" anchor="ctr">
+            <a:spAutoFit/>
+          </a:bodyPr>
+          <a:lstStyle/>
+          <a:p>
+            <a:pPr algn="ctr"/>
+            <a:r>
+              <a:rPr lang="de-DE" sz="700" dirty="0">
+                <a:solidFill>
+                  <a:schemeClr val="bg1"/>
+                </a:solidFill>
+                <a:latin typeface="Roboto" panose="02000000000000000000" pitchFamily="2" charset="0"/>
+                <a:ea typeface="Roboto" panose="02000000000000000000" pitchFamily="2" charset="0"/>
+                <a:cs typeface="Roboto" panose="02000000000000000000" pitchFamily="2" charset="0"/>
+              </a:rPr>
+              <a:t>Airfoil alpha0</a:t>
+            </a:r>
+            <a:endParaRPr lang="en-US" sz="700" dirty="0">
+              <a:solidFill>
+                <a:schemeClr val="bg1"/>
+              </a:solidFill>
+              <a:latin typeface="Roboto" panose="02000000000000000000" pitchFamily="2" charset="0"/>
+              <a:ea typeface="Roboto" panose="02000000000000000000" pitchFamily="2" charset="0"/>
+              <a:cs typeface="Roboto" panose="02000000000000000000" pitchFamily="2" charset="0"/>
+            </a:endParaRPr>
+          </a:p>
+        </p:txBody>
+      </p:sp>
     </p:spTree>
     <p:extLst>
       <p:ext uri="{BB962C8B-B14F-4D97-AF65-F5344CB8AC3E}">

</xml_diff>

<commit_message>
Allow free form reference line (not only banana)
</commit_message>
<xml_diff>
--- a/images/image_design.pptx
+++ b/images/image_design.pptx
@@ -26,10 +26,13 @@
     <p:sldId id="285" r:id="rId20"/>
     <p:sldId id="284" r:id="rId21"/>
     <p:sldId id="287" r:id="rId22"/>
-    <p:sldId id="288" r:id="rId23"/>
-    <p:sldId id="289" r:id="rId24"/>
-    <p:sldId id="290" r:id="rId25"/>
-    <p:sldId id="264" r:id="rId26"/>
+    <p:sldId id="293" r:id="rId23"/>
+    <p:sldId id="288" r:id="rId24"/>
+    <p:sldId id="289" r:id="rId25"/>
+    <p:sldId id="290" r:id="rId26"/>
+    <p:sldId id="291" r:id="rId27"/>
+    <p:sldId id="292" r:id="rId28"/>
+    <p:sldId id="264" r:id="rId29"/>
   </p:sldIdLst>
   <p:sldSz cx="12192000" cy="6858000"/>
   <p:notesSz cx="6858000" cy="9144000"/>
@@ -10779,6 +10782,82 @@
         <p:cNvPr id="1" name="">
           <a:extLst>
             <a:ext uri="{FF2B5EF4-FFF2-40B4-BE49-F238E27FC236}">
+              <a16:creationId xmlns:a16="http://schemas.microsoft.com/office/drawing/2014/main" id="{A443DE12-3702-388D-0970-16B81F71FE3C}"/>
+            </a:ext>
+          </a:extLst>
+        </p:cNvPr>
+        <p:cNvGrpSpPr/>
+        <p:nvPr/>
+      </p:nvGrpSpPr>
+      <p:grpSpPr>
+        <a:xfrm>
+          <a:off x="0" y="0"/>
+          <a:ext cx="0" cy="0"/>
+          <a:chOff x="0" y="0"/>
+          <a:chExt cx="0" cy="0"/>
+        </a:xfrm>
+      </p:grpSpPr>
+      <p:pic>
+        <p:nvPicPr>
+          <p:cNvPr id="3" name="Grafik 2">
+            <a:extLst>
+              <a:ext uri="{FF2B5EF4-FFF2-40B4-BE49-F238E27FC236}">
+                <a16:creationId xmlns:a16="http://schemas.microsoft.com/office/drawing/2014/main" id="{5AF11839-16AF-DFF1-0797-B71070DFC1B8}"/>
+              </a:ext>
+            </a:extLst>
+          </p:cNvPr>
+          <p:cNvPicPr>
+            <a:picLocks noChangeAspect="1"/>
+          </p:cNvPicPr>
+          <p:nvPr/>
+        </p:nvPicPr>
+        <p:blipFill>
+          <a:blip r:embed="rId2"/>
+          <a:stretch>
+            <a:fillRect/>
+          </a:stretch>
+        </p:blipFill>
+        <p:spPr>
+          <a:xfrm>
+            <a:off x="1055689" y="836614"/>
+            <a:ext cx="1608684" cy="157800"/>
+          </a:xfrm>
+          <a:prstGeom prst="rect">
+            <a:avLst/>
+          </a:prstGeom>
+        </p:spPr>
+      </p:pic>
+    </p:spTree>
+    <p:extLst>
+      <p:ext uri="{BB962C8B-B14F-4D97-AF65-F5344CB8AC3E}">
+        <p14:creationId xmlns:p14="http://schemas.microsoft.com/office/powerpoint/2010/main" val="1332511345"/>
+      </p:ext>
+    </p:extLst>
+  </p:cSld>
+  <p:clrMapOvr>
+    <a:masterClrMapping/>
+  </p:clrMapOvr>
+</p:sld>
+</file>
+
+<file path=ppt/slides/slide23.xml><?xml version="1.0" encoding="utf-8"?>
+<p:sld xmlns:a="http://schemas.openxmlformats.org/drawingml/2006/main" xmlns:r="http://schemas.openxmlformats.org/officeDocument/2006/relationships" xmlns:p="http://schemas.openxmlformats.org/presentationml/2006/main">
+  <p:cSld>
+    <p:bg>
+      <p:bgPr>
+        <a:solidFill>
+          <a:schemeClr val="bg2">
+            <a:lumMod val="25000"/>
+          </a:schemeClr>
+        </a:solidFill>
+        <a:effectLst/>
+      </p:bgPr>
+    </p:bg>
+    <p:spTree>
+      <p:nvGrpSpPr>
+        <p:cNvPr id="1" name="">
+          <a:extLst>
+            <a:ext uri="{FF2B5EF4-FFF2-40B4-BE49-F238E27FC236}">
               <a16:creationId xmlns:a16="http://schemas.microsoft.com/office/drawing/2014/main" id="{5FF33279-97FA-EDE2-78E2-A49BFB3FC1FE}"/>
             </a:ext>
           </a:extLst>
@@ -10917,7 +10996,7 @@
 </p:sld>
 </file>
 
-<file path=ppt/slides/slide23.xml><?xml version="1.0" encoding="utf-8"?>
+<file path=ppt/slides/slide24.xml><?xml version="1.0" encoding="utf-8"?>
 <p:sld xmlns:a="http://schemas.openxmlformats.org/drawingml/2006/main" xmlns:r="http://schemas.openxmlformats.org/officeDocument/2006/relationships" xmlns:p="http://schemas.openxmlformats.org/presentationml/2006/main">
   <p:cSld>
     <p:bg>
@@ -11667,7 +11746,7 @@
 </p:sld>
 </file>
 
-<file path=ppt/slides/slide24.xml><?xml version="1.0" encoding="utf-8"?>
+<file path=ppt/slides/slide25.xml><?xml version="1.0" encoding="utf-8"?>
 <p:sld xmlns:a="http://schemas.openxmlformats.org/drawingml/2006/main" xmlns:r="http://schemas.openxmlformats.org/officeDocument/2006/relationships" xmlns:p="http://schemas.openxmlformats.org/presentationml/2006/main">
   <p:cSld>
     <p:bg>
@@ -12523,7 +12602,338 @@
 </p:sld>
 </file>
 
-<file path=ppt/slides/slide25.xml><?xml version="1.0" encoding="utf-8"?>
+<file path=ppt/slides/slide26.xml><?xml version="1.0" encoding="utf-8"?>
+<p:sld xmlns:a="http://schemas.openxmlformats.org/drawingml/2006/main" xmlns:r="http://schemas.openxmlformats.org/officeDocument/2006/relationships" xmlns:p="http://schemas.openxmlformats.org/presentationml/2006/main">
+  <p:cSld>
+    <p:bg>
+      <p:bgPr>
+        <a:solidFill>
+          <a:schemeClr val="bg2">
+            <a:lumMod val="25000"/>
+          </a:schemeClr>
+        </a:solidFill>
+        <a:effectLst/>
+      </p:bgPr>
+    </p:bg>
+    <p:spTree>
+      <p:nvGrpSpPr>
+        <p:cNvPr id="1" name="">
+          <a:extLst>
+            <a:ext uri="{FF2B5EF4-FFF2-40B4-BE49-F238E27FC236}">
+              <a16:creationId xmlns:a16="http://schemas.microsoft.com/office/drawing/2014/main" id="{894E7EE9-EE28-3A0D-35B0-25AF9DD95093}"/>
+            </a:ext>
+          </a:extLst>
+        </p:cNvPr>
+        <p:cNvGrpSpPr/>
+        <p:nvPr/>
+      </p:nvGrpSpPr>
+      <p:grpSpPr>
+        <a:xfrm>
+          <a:off x="0" y="0"/>
+          <a:ext cx="0" cy="0"/>
+          <a:chOff x="0" y="0"/>
+          <a:chExt cx="0" cy="0"/>
+        </a:xfrm>
+      </p:grpSpPr>
+      <p:pic>
+        <p:nvPicPr>
+          <p:cNvPr id="3" name="Grafik 2">
+            <a:extLst>
+              <a:ext uri="{FF2B5EF4-FFF2-40B4-BE49-F238E27FC236}">
+                <a16:creationId xmlns:a16="http://schemas.microsoft.com/office/drawing/2014/main" id="{E5F538C8-AB01-D350-B8D8-97FBF157ABA3}"/>
+              </a:ext>
+            </a:extLst>
+          </p:cNvPr>
+          <p:cNvPicPr>
+            <a:picLocks noChangeAspect="1"/>
+          </p:cNvPicPr>
+          <p:nvPr/>
+        </p:nvPicPr>
+        <p:blipFill>
+          <a:blip r:embed="rId2"/>
+          <a:stretch>
+            <a:fillRect/>
+          </a:stretch>
+        </p:blipFill>
+        <p:spPr>
+          <a:xfrm>
+            <a:off x="1055688" y="836613"/>
+            <a:ext cx="7440612" cy="1758974"/>
+          </a:xfrm>
+          <a:prstGeom prst="rect">
+            <a:avLst/>
+          </a:prstGeom>
+        </p:spPr>
+      </p:pic>
+      <p:pic>
+        <p:nvPicPr>
+          <p:cNvPr id="5" name="Grafik 4">
+            <a:extLst>
+              <a:ext uri="{FF2B5EF4-FFF2-40B4-BE49-F238E27FC236}">
+                <a16:creationId xmlns:a16="http://schemas.microsoft.com/office/drawing/2014/main" id="{D8E80417-2CFF-0361-256C-B1AE38F6C0F9}"/>
+              </a:ext>
+            </a:extLst>
+          </p:cNvPr>
+          <p:cNvPicPr>
+            <a:picLocks noChangeAspect="1"/>
+          </p:cNvPicPr>
+          <p:nvPr/>
+        </p:nvPicPr>
+        <p:blipFill>
+          <a:blip r:embed="rId3"/>
+          <a:stretch>
+            <a:fillRect/>
+          </a:stretch>
+        </p:blipFill>
+        <p:spPr>
+          <a:xfrm>
+            <a:off x="1055688" y="2696096"/>
+            <a:ext cx="7440612" cy="1783853"/>
+          </a:xfrm>
+          <a:prstGeom prst="rect">
+            <a:avLst/>
+          </a:prstGeom>
+        </p:spPr>
+      </p:pic>
+      <p:sp>
+        <p:nvSpPr>
+          <p:cNvPr id="10" name="Textfeld 9">
+            <a:extLst>
+              <a:ext uri="{FF2B5EF4-FFF2-40B4-BE49-F238E27FC236}">
+                <a16:creationId xmlns:a16="http://schemas.microsoft.com/office/drawing/2014/main" id="{1899D425-F7CA-630E-616C-CB005F18A164}"/>
+              </a:ext>
+            </a:extLst>
+          </p:cNvPr>
+          <p:cNvSpPr txBox="1"/>
+          <p:nvPr/>
+        </p:nvSpPr>
+        <p:spPr>
+          <a:xfrm>
+            <a:off x="3814847" y="3588022"/>
+            <a:ext cx="1516105" cy="307777"/>
+          </a:xfrm>
+          <a:prstGeom prst="rect">
+            <a:avLst/>
+          </a:prstGeom>
+          <a:solidFill>
+            <a:schemeClr val="tx1">
+              <a:lumMod val="85000"/>
+              <a:lumOff val="15000"/>
+              <a:alpha val="72000"/>
+            </a:schemeClr>
+          </a:solidFill>
+        </p:spPr>
+        <p:txBody>
+          <a:bodyPr wrap="square">
+            <a:spAutoFit/>
+          </a:bodyPr>
+          <a:lstStyle/>
+          <a:p>
+            <a:r>
+              <a:rPr lang="en-US" sz="1400" dirty="0">
+                <a:solidFill>
+                  <a:prstClr val="white">
+                    <a:lumMod val="95000"/>
+                  </a:prstClr>
+                </a:solidFill>
+                <a:latin typeface="Roboto" panose="02000000000000000000" pitchFamily="2" charset="0"/>
+                <a:ea typeface="Roboto" panose="02000000000000000000" pitchFamily="2" charset="0"/>
+                <a:cs typeface="Roboto" panose="02000000000000000000" pitchFamily="2" charset="0"/>
+              </a:rPr>
+              <a:t>alpha set to max</a:t>
+            </a:r>
+          </a:p>
+        </p:txBody>
+      </p:sp>
+      <p:sp>
+        <p:nvSpPr>
+          <p:cNvPr id="6" name="Textfeld 5">
+            <a:extLst>
+              <a:ext uri="{FF2B5EF4-FFF2-40B4-BE49-F238E27FC236}">
+                <a16:creationId xmlns:a16="http://schemas.microsoft.com/office/drawing/2014/main" id="{6E278F23-49FD-E386-B5EA-DC975F432B2F}"/>
+              </a:ext>
+            </a:extLst>
+          </p:cNvPr>
+          <p:cNvSpPr txBox="1"/>
+          <p:nvPr/>
+        </p:nvSpPr>
+        <p:spPr>
+          <a:xfrm>
+            <a:off x="4017941" y="1562211"/>
+            <a:ext cx="1516105" cy="307777"/>
+          </a:xfrm>
+          <a:prstGeom prst="rect">
+            <a:avLst/>
+          </a:prstGeom>
+          <a:solidFill>
+            <a:schemeClr val="tx1">
+              <a:lumMod val="85000"/>
+              <a:lumOff val="15000"/>
+              <a:alpha val="72000"/>
+            </a:schemeClr>
+          </a:solidFill>
+        </p:spPr>
+        <p:txBody>
+          <a:bodyPr wrap="square">
+            <a:spAutoFit/>
+          </a:bodyPr>
+          <a:lstStyle/>
+          <a:p>
+            <a:r>
+              <a:rPr lang="en-US" sz="1400" dirty="0">
+                <a:solidFill>
+                  <a:prstClr val="white">
+                    <a:lumMod val="95000"/>
+                  </a:prstClr>
+                </a:solidFill>
+                <a:latin typeface="Roboto" panose="02000000000000000000" pitchFamily="2" charset="0"/>
+                <a:ea typeface="Roboto" panose="02000000000000000000" pitchFamily="2" charset="0"/>
+                <a:cs typeface="Roboto" panose="02000000000000000000" pitchFamily="2" charset="0"/>
+              </a:rPr>
+              <a:t>alpha = 2°</a:t>
+            </a:r>
+          </a:p>
+        </p:txBody>
+      </p:sp>
+    </p:spTree>
+    <p:extLst>
+      <p:ext uri="{BB962C8B-B14F-4D97-AF65-F5344CB8AC3E}">
+        <p14:creationId xmlns:p14="http://schemas.microsoft.com/office/powerpoint/2010/main" val="741052562"/>
+      </p:ext>
+    </p:extLst>
+  </p:cSld>
+  <p:clrMapOvr>
+    <a:masterClrMapping/>
+  </p:clrMapOvr>
+</p:sld>
+</file>
+
+<file path=ppt/slides/slide27.xml><?xml version="1.0" encoding="utf-8"?>
+<p:sld xmlns:a="http://schemas.openxmlformats.org/drawingml/2006/main" xmlns:r="http://schemas.openxmlformats.org/officeDocument/2006/relationships" xmlns:p="http://schemas.openxmlformats.org/presentationml/2006/main">
+  <p:cSld>
+    <p:bg>
+      <p:bgPr>
+        <a:solidFill>
+          <a:schemeClr val="bg2">
+            <a:lumMod val="25000"/>
+          </a:schemeClr>
+        </a:solidFill>
+        <a:effectLst/>
+      </p:bgPr>
+    </p:bg>
+    <p:spTree>
+      <p:nvGrpSpPr>
+        <p:cNvPr id="1" name="">
+          <a:extLst>
+            <a:ext uri="{FF2B5EF4-FFF2-40B4-BE49-F238E27FC236}">
+              <a16:creationId xmlns:a16="http://schemas.microsoft.com/office/drawing/2014/main" id="{CD6B8C15-ED01-ADF6-E358-1A2C71F43D6C}"/>
+            </a:ext>
+          </a:extLst>
+        </p:cNvPr>
+        <p:cNvGrpSpPr/>
+        <p:nvPr/>
+      </p:nvGrpSpPr>
+      <p:grpSpPr>
+        <a:xfrm>
+          <a:off x="0" y="0"/>
+          <a:ext cx="0" cy="0"/>
+          <a:chOff x="0" y="0"/>
+          <a:chExt cx="0" cy="0"/>
+        </a:xfrm>
+      </p:grpSpPr>
+      <p:sp>
+        <p:nvSpPr>
+          <p:cNvPr id="6" name="Textfeld 5">
+            <a:extLst>
+              <a:ext uri="{FF2B5EF4-FFF2-40B4-BE49-F238E27FC236}">
+                <a16:creationId xmlns:a16="http://schemas.microsoft.com/office/drawing/2014/main" id="{E6DEB4D7-1618-F96E-3B84-EE7E66A25253}"/>
+              </a:ext>
+            </a:extLst>
+          </p:cNvPr>
+          <p:cNvSpPr txBox="1"/>
+          <p:nvPr/>
+        </p:nvSpPr>
+        <p:spPr>
+          <a:xfrm>
+            <a:off x="8913134" y="1822342"/>
+            <a:ext cx="1516105" cy="307777"/>
+          </a:xfrm>
+          <a:prstGeom prst="rect">
+            <a:avLst/>
+          </a:prstGeom>
+          <a:solidFill>
+            <a:schemeClr val="tx1">
+              <a:lumMod val="85000"/>
+              <a:lumOff val="15000"/>
+              <a:alpha val="72000"/>
+            </a:schemeClr>
+          </a:solidFill>
+        </p:spPr>
+        <p:txBody>
+          <a:bodyPr wrap="square">
+            <a:spAutoFit/>
+          </a:bodyPr>
+          <a:lstStyle/>
+          <a:p>
+            <a:r>
+              <a:rPr lang="en-US" sz="1400" dirty="0">
+                <a:solidFill>
+                  <a:prstClr val="white">
+                    <a:lumMod val="95000"/>
+                  </a:prstClr>
+                </a:solidFill>
+                <a:latin typeface="Roboto" panose="02000000000000000000" pitchFamily="2" charset="0"/>
+                <a:ea typeface="Roboto" panose="02000000000000000000" pitchFamily="2" charset="0"/>
+                <a:cs typeface="Roboto" panose="02000000000000000000" pitchFamily="2" charset="0"/>
+              </a:rPr>
+              <a:t>alpha = 2°</a:t>
+            </a:r>
+          </a:p>
+        </p:txBody>
+      </p:sp>
+      <p:pic>
+        <p:nvPicPr>
+          <p:cNvPr id="2" name="Grafik 1" descr="Ein Bild, das Screenshot, Text, Reihe, Diagramm enthält.&#10;&#10;KI-generierte Inhalte können fehlerhaft sein.">
+            <a:extLst>
+              <a:ext uri="{FF2B5EF4-FFF2-40B4-BE49-F238E27FC236}">
+                <a16:creationId xmlns:a16="http://schemas.microsoft.com/office/drawing/2014/main" id="{CA0109C7-7556-4CCC-C077-2571F9C03C29}"/>
+              </a:ext>
+            </a:extLst>
+          </p:cNvPr>
+          <p:cNvPicPr>
+            <a:picLocks noChangeAspect="1"/>
+          </p:cNvPicPr>
+          <p:nvPr/>
+        </p:nvPicPr>
+        <p:blipFill>
+          <a:blip r:embed="rId2"/>
+          <a:srcRect l="523" t="817" r="596" b="1233"/>
+          <a:stretch/>
+        </p:blipFill>
+        <p:spPr>
+          <a:xfrm>
+            <a:off x="1055688" y="836613"/>
+            <a:ext cx="3626671" cy="3020341"/>
+          </a:xfrm>
+          <a:prstGeom prst="rect">
+            <a:avLst/>
+          </a:prstGeom>
+        </p:spPr>
+      </p:pic>
+    </p:spTree>
+    <p:extLst>
+      <p:ext uri="{BB962C8B-B14F-4D97-AF65-F5344CB8AC3E}">
+        <p14:creationId xmlns:p14="http://schemas.microsoft.com/office/powerpoint/2010/main" val="722134362"/>
+      </p:ext>
+    </p:extLst>
+  </p:cSld>
+  <p:clrMapOvr>
+    <a:masterClrMapping/>
+  </p:clrMapOvr>
+</p:sld>
+</file>
+
+<file path=ppt/slides/slide28.xml><?xml version="1.0" encoding="utf-8"?>
 <p:sld xmlns:a="http://schemas.openxmlformats.org/drawingml/2006/main" xmlns:r="http://schemas.openxmlformats.org/officeDocument/2006/relationships" xmlns:p="http://schemas.openxmlformats.org/presentationml/2006/main">
   <p:cSld>
     <p:spTree>

</xml_diff>